<commit_message>
V Beta 3.1 Fixes + documentation update
</commit_message>
<xml_diff>
--- a/Presentation/Tower Defense.pptx
+++ b/Presentation/Tower Defense.pptx
@@ -5,22 +5,29 @@
     <p:sldMasterId id="2147483648" r:id="rId1"/>
   </p:sldMasterIdLst>
   <p:notesMasterIdLst>
-    <p:notesMasterId r:id="rId12"/>
+    <p:notesMasterId r:id="rId19"/>
   </p:notesMasterIdLst>
   <p:handoutMasterIdLst>
-    <p:handoutMasterId r:id="rId13"/>
+    <p:handoutMasterId r:id="rId20"/>
   </p:handoutMasterIdLst>
   <p:sldIdLst>
     <p:sldId id="257" r:id="rId2"/>
     <p:sldId id="260" r:id="rId3"/>
-    <p:sldId id="259" r:id="rId4"/>
-    <p:sldId id="261" r:id="rId5"/>
-    <p:sldId id="267" r:id="rId6"/>
-    <p:sldId id="265" r:id="rId7"/>
-    <p:sldId id="266" r:id="rId8"/>
-    <p:sldId id="262" r:id="rId9"/>
-    <p:sldId id="264" r:id="rId10"/>
-    <p:sldId id="263" r:id="rId11"/>
+    <p:sldId id="275" r:id="rId4"/>
+    <p:sldId id="268" r:id="rId5"/>
+    <p:sldId id="261" r:id="rId6"/>
+    <p:sldId id="269" r:id="rId7"/>
+    <p:sldId id="267" r:id="rId8"/>
+    <p:sldId id="270" r:id="rId9"/>
+    <p:sldId id="265" r:id="rId10"/>
+    <p:sldId id="271" r:id="rId11"/>
+    <p:sldId id="272" r:id="rId12"/>
+    <p:sldId id="262" r:id="rId13"/>
+    <p:sldId id="276" r:id="rId14"/>
+    <p:sldId id="277" r:id="rId15"/>
+    <p:sldId id="274" r:id="rId16"/>
+    <p:sldId id="273" r:id="rId17"/>
+    <p:sldId id="264" r:id="rId18"/>
   </p:sldIdLst>
   <p:sldSz cx="9144000" cy="6858000" type="screen4x3"/>
   <p:notesSz cx="6858000" cy="9144000"/>
@@ -271,7 +278,7 @@
             <a:fld id="{5DD5651A-C39F-4C37-B987-FE606585C7B4}" type="datetimeFigureOut">
               <a:rPr lang="nl-NL" altLang="nl-NL"/>
               <a:pPr/>
-              <a:t>28-3-2016</a:t>
+              <a:t>30-3-2016</a:t>
             </a:fld>
             <a:endParaRPr lang="nl-NL" altLang="nl-NL"/>
           </a:p>
@@ -469,7 +476,7 @@
             <a:fld id="{81802AFC-00AE-43A4-B775-C9D85390969C}" type="datetimeFigureOut">
               <a:rPr lang="nl-NL" altLang="nl-NL"/>
               <a:pPr/>
-              <a:t>28-3-2016</a:t>
+              <a:t>30-3-2016</a:t>
             </a:fld>
             <a:endParaRPr lang="nl-NL" altLang="nl-NL"/>
           </a:p>
@@ -824,6 +831,119 @@
           <a:bodyPr/>
           <a:lstStyle/>
           <a:p>
+            <a:r>
+              <a:rPr lang="en-US" dirty="0"/>
+              <a:t>In</a:t>
+            </a:r>
+            <a:r>
+              <a:rPr lang="en-US" baseline="0" dirty="0"/>
+              <a:t> order to explain this mess of networks a look is made in the </a:t>
+            </a:r>
+            <a:r>
+              <a:rPr lang="en-US" baseline="0" dirty="0" err="1"/>
+              <a:t>init</a:t>
+            </a:r>
+            <a:r>
+              <a:rPr lang="en-US" baseline="0" dirty="0"/>
+              <a:t> function and the keyboard function along with the </a:t>
+            </a:r>
+            <a:r>
+              <a:rPr lang="en-US" baseline="0" dirty="0" err="1"/>
+              <a:t>nececarry</a:t>
+            </a:r>
+            <a:r>
+              <a:rPr lang="en-US" baseline="0" dirty="0"/>
+              <a:t> stops into classes </a:t>
+            </a:r>
+            <a:r>
+              <a:rPr lang="en-US" baseline="0" dirty="0" err="1"/>
+              <a:t>etc</a:t>
+            </a:r>
+            <a:endParaRPr lang="nl-NL" dirty="0"/>
+          </a:p>
+        </p:txBody>
+      </p:sp>
+      <p:sp>
+        <p:nvSpPr>
+          <p:cNvPr id="4" name="Tijdelijke aanduiding voor dianummer 3"/>
+          <p:cNvSpPr>
+            <a:spLocks noGrp="1"/>
+          </p:cNvSpPr>
+          <p:nvPr>
+            <p:ph type="sldNum" sz="quarter" idx="10"/>
+          </p:nvPr>
+        </p:nvSpPr>
+        <p:spPr/>
+        <p:txBody>
+          <a:bodyPr/>
+          <a:lstStyle/>
+          <a:p>
+            <a:fld id="{9E4F326F-F668-4108-8325-A47E91BBCCCE}" type="slidenum">
+              <a:rPr lang="nl-NL" altLang="nl-NL" smtClean="0"/>
+              <a:pPr/>
+              <a:t>5</a:t>
+            </a:fld>
+            <a:endParaRPr lang="nl-NL" altLang="nl-NL"/>
+          </a:p>
+        </p:txBody>
+      </p:sp>
+    </p:spTree>
+    <p:extLst>
+      <p:ext uri="{BB962C8B-B14F-4D97-AF65-F5344CB8AC3E}">
+        <p14:creationId xmlns:p14="http://schemas.microsoft.com/office/powerpoint/2010/main" val="1497108994"/>
+      </p:ext>
+    </p:extLst>
+  </p:cSld>
+  <p:clrMapOvr>
+    <a:masterClrMapping/>
+  </p:clrMapOvr>
+</p:notes>
+</file>
+
+<file path=ppt/notesSlides/notesSlide2.xml><?xml version="1.0" encoding="utf-8"?>
+<p:notes xmlns:a="http://schemas.openxmlformats.org/drawingml/2006/main" xmlns:r="http://schemas.openxmlformats.org/officeDocument/2006/relationships" xmlns:p="http://schemas.openxmlformats.org/presentationml/2006/main">
+  <p:cSld>
+    <p:spTree>
+      <p:nvGrpSpPr>
+        <p:cNvPr id="1" name=""/>
+        <p:cNvGrpSpPr/>
+        <p:nvPr/>
+      </p:nvGrpSpPr>
+      <p:grpSpPr>
+        <a:xfrm>
+          <a:off x="0" y="0"/>
+          <a:ext cx="0" cy="0"/>
+          <a:chOff x="0" y="0"/>
+          <a:chExt cx="0" cy="0"/>
+        </a:xfrm>
+      </p:grpSpPr>
+      <p:sp>
+        <p:nvSpPr>
+          <p:cNvPr id="2" name="Tijdelijke aanduiding voor dia-afbeelding 1"/>
+          <p:cNvSpPr>
+            <a:spLocks noGrp="1" noRot="1" noChangeAspect="1"/>
+          </p:cNvSpPr>
+          <p:nvPr>
+            <p:ph type="sldImg"/>
+          </p:nvPr>
+        </p:nvSpPr>
+        <p:spPr/>
+      </p:sp>
+      <p:sp>
+        <p:nvSpPr>
+          <p:cNvPr id="3" name="Tijdelijke aanduiding voor notities 2"/>
+          <p:cNvSpPr>
+            <a:spLocks noGrp="1"/>
+          </p:cNvSpPr>
+          <p:nvPr>
+            <p:ph type="body" idx="1"/>
+          </p:nvPr>
+        </p:nvSpPr>
+        <p:spPr/>
+        <p:txBody>
+          <a:bodyPr/>
+          <a:lstStyle/>
+          <a:p>
             <a:endParaRPr lang="nl-NL" dirty="0"/>
           </a:p>
         </p:txBody>
@@ -855,7 +975,92 @@
     </p:spTree>
     <p:extLst>
       <p:ext uri="{BB962C8B-B14F-4D97-AF65-F5344CB8AC3E}">
-        <p14:creationId xmlns:p14="http://schemas.microsoft.com/office/powerpoint/2010/main" val="2518937728"/>
+        <p14:creationId xmlns:p14="http://schemas.microsoft.com/office/powerpoint/2010/main" val="1416038781"/>
+      </p:ext>
+    </p:extLst>
+  </p:cSld>
+  <p:clrMapOvr>
+    <a:masterClrMapping/>
+  </p:clrMapOvr>
+</p:notes>
+</file>
+
+<file path=ppt/notesSlides/notesSlide3.xml><?xml version="1.0" encoding="utf-8"?>
+<p:notes xmlns:a="http://schemas.openxmlformats.org/drawingml/2006/main" xmlns:r="http://schemas.openxmlformats.org/officeDocument/2006/relationships" xmlns:p="http://schemas.openxmlformats.org/presentationml/2006/main">
+  <p:cSld>
+    <p:spTree>
+      <p:nvGrpSpPr>
+        <p:cNvPr id="1" name=""/>
+        <p:cNvGrpSpPr/>
+        <p:nvPr/>
+      </p:nvGrpSpPr>
+      <p:grpSpPr>
+        <a:xfrm>
+          <a:off x="0" y="0"/>
+          <a:ext cx="0" cy="0"/>
+          <a:chOff x="0" y="0"/>
+          <a:chExt cx="0" cy="0"/>
+        </a:xfrm>
+      </p:grpSpPr>
+      <p:sp>
+        <p:nvSpPr>
+          <p:cNvPr id="2" name="Tijdelijke aanduiding voor dia-afbeelding 1"/>
+          <p:cNvSpPr>
+            <a:spLocks noGrp="1" noRot="1" noChangeAspect="1"/>
+          </p:cNvSpPr>
+          <p:nvPr>
+            <p:ph type="sldImg"/>
+          </p:nvPr>
+        </p:nvSpPr>
+        <p:spPr/>
+      </p:sp>
+      <p:sp>
+        <p:nvSpPr>
+          <p:cNvPr id="3" name="Tijdelijke aanduiding voor notities 2"/>
+          <p:cNvSpPr>
+            <a:spLocks noGrp="1"/>
+          </p:cNvSpPr>
+          <p:nvPr>
+            <p:ph type="body" idx="1"/>
+          </p:nvPr>
+        </p:nvSpPr>
+        <p:spPr/>
+        <p:txBody>
+          <a:bodyPr/>
+          <a:lstStyle/>
+          <a:p>
+            <a:endParaRPr lang="nl-NL" dirty="0"/>
+          </a:p>
+        </p:txBody>
+      </p:sp>
+      <p:sp>
+        <p:nvSpPr>
+          <p:cNvPr id="4" name="Tijdelijke aanduiding voor dianummer 3"/>
+          <p:cNvSpPr>
+            <a:spLocks noGrp="1"/>
+          </p:cNvSpPr>
+          <p:nvPr>
+            <p:ph type="sldNum" sz="quarter" idx="10"/>
+          </p:nvPr>
+        </p:nvSpPr>
+        <p:spPr/>
+        <p:txBody>
+          <a:bodyPr/>
+          <a:lstStyle/>
+          <a:p>
+            <a:fld id="{9E4F326F-F668-4108-8325-A47E91BBCCCE}" type="slidenum">
+              <a:rPr lang="nl-NL" altLang="nl-NL" smtClean="0"/>
+              <a:pPr/>
+              <a:t>8</a:t>
+            </a:fld>
+            <a:endParaRPr lang="nl-NL" altLang="nl-NL"/>
+          </a:p>
+        </p:txBody>
+      </p:sp>
+    </p:spTree>
+    <p:extLst>
+      <p:ext uri="{BB962C8B-B14F-4D97-AF65-F5344CB8AC3E}">
+        <p14:creationId xmlns:p14="http://schemas.microsoft.com/office/powerpoint/2010/main" val="2263777845"/>
       </p:ext>
     </p:extLst>
   </p:cSld>
@@ -5339,7 +5544,7 @@
                 <a:latin typeface="Arial" panose="020B0604020202020204" pitchFamily="34" charset="0"/>
                 <a:cs typeface="Arial" panose="020B0604020202020204" pitchFamily="34" charset="0"/>
               </a:rPr>
-              <a:t>C++ / GLUT</a:t>
+              <a:t>C++ &amp; GLUT</a:t>
             </a:r>
             <a:endParaRPr lang="nl-NL" altLang="nl-NL" dirty="0">
               <a:latin typeface="Arial" panose="020B0604020202020204" pitchFamily="34" charset="0"/>
@@ -5454,6 +5659,294 @@
 </file>
 
 <file path=ppt/slides/slide10.xml><?xml version="1.0" encoding="utf-8"?>
+<p:sld xmlns:a="http://schemas.openxmlformats.org/drawingml/2006/main" xmlns:r="http://schemas.openxmlformats.org/officeDocument/2006/relationships" xmlns:p="http://schemas.openxmlformats.org/presentationml/2006/main" show="0">
+  <p:cSld>
+    <p:spTree>
+      <p:nvGrpSpPr>
+        <p:cNvPr id="1" name=""/>
+        <p:cNvGrpSpPr/>
+        <p:nvPr/>
+      </p:nvGrpSpPr>
+      <p:grpSpPr>
+        <a:xfrm>
+          <a:off x="0" y="0"/>
+          <a:ext cx="0" cy="0"/>
+          <a:chOff x="0" y="0"/>
+          <a:chExt cx="0" cy="0"/>
+        </a:xfrm>
+      </p:grpSpPr>
+      <p:sp>
+        <p:nvSpPr>
+          <p:cNvPr id="3" name="Ondertitel 2"/>
+          <p:cNvSpPr>
+            <a:spLocks noGrp="1"/>
+          </p:cNvSpPr>
+          <p:nvPr>
+            <p:ph type="subTitle" idx="1"/>
+          </p:nvPr>
+        </p:nvSpPr>
+        <p:spPr/>
+        <p:txBody>
+          <a:bodyPr/>
+          <a:lstStyle/>
+          <a:p>
+            <a:endParaRPr lang="nl-NL"/>
+          </a:p>
+        </p:txBody>
+      </p:sp>
+      <p:sp>
+        <p:nvSpPr>
+          <p:cNvPr id="4" name="Tijdelijke aanduiding voor dianummer 3"/>
+          <p:cNvSpPr>
+            <a:spLocks noGrp="1"/>
+          </p:cNvSpPr>
+          <p:nvPr>
+            <p:ph type="sldNum" sz="quarter" idx="10"/>
+          </p:nvPr>
+        </p:nvSpPr>
+        <p:spPr/>
+        <p:txBody>
+          <a:bodyPr/>
+          <a:lstStyle/>
+          <a:p>
+            <a:fld id="{15A33517-824B-4115-AD3E-16E3532C9CE7}" type="slidenum">
+              <a:rPr lang="nl-NL" altLang="nl-NL" smtClean="0"/>
+              <a:pPr/>
+              <a:t>10</a:t>
+            </a:fld>
+            <a:endParaRPr lang="nl-NL" altLang="nl-NL"/>
+          </a:p>
+        </p:txBody>
+      </p:sp>
+      <p:sp>
+        <p:nvSpPr>
+          <p:cNvPr id="6" name="Tijdelijke aanduiding voor inhoud 5"/>
+          <p:cNvSpPr>
+            <a:spLocks noGrp="1"/>
+          </p:cNvSpPr>
+          <p:nvPr>
+            <p:ph sz="half" idx="2"/>
+          </p:nvPr>
+        </p:nvSpPr>
+        <p:spPr/>
+        <p:txBody>
+          <a:bodyPr/>
+          <a:lstStyle/>
+          <a:p>
+            <a:r>
+              <a:rPr lang="en-US" dirty="0" err="1"/>
+              <a:t>Keyfunc</a:t>
+            </a:r>
+            <a:r>
+              <a:rPr lang="en-US" dirty="0"/>
+              <a:t>()</a:t>
+            </a:r>
+          </a:p>
+          <a:p>
+            <a:endParaRPr lang="nl-NL" dirty="0"/>
+          </a:p>
+        </p:txBody>
+      </p:sp>
+      <p:pic>
+        <p:nvPicPr>
+          <p:cNvPr id="7" name="Afbeelding 6"/>
+          <p:cNvPicPr>
+            <a:picLocks noChangeAspect="1"/>
+          </p:cNvPicPr>
+          <p:nvPr/>
+        </p:nvPicPr>
+        <p:blipFill>
+          <a:blip r:embed="rId2"/>
+          <a:stretch>
+            <a:fillRect/>
+          </a:stretch>
+        </p:blipFill>
+        <p:spPr>
+          <a:xfrm>
+            <a:off x="2221441" y="1129719"/>
+            <a:ext cx="6372225" cy="4876800"/>
+          </a:xfrm>
+          <a:prstGeom prst="rect">
+            <a:avLst/>
+          </a:prstGeom>
+        </p:spPr>
+      </p:pic>
+    </p:spTree>
+    <p:extLst>
+      <p:ext uri="{BB962C8B-B14F-4D97-AF65-F5344CB8AC3E}">
+        <p14:creationId xmlns:p14="http://schemas.microsoft.com/office/powerpoint/2010/main" val="3013540886"/>
+      </p:ext>
+    </p:extLst>
+  </p:cSld>
+  <p:clrMapOvr>
+    <a:masterClrMapping/>
+  </p:clrMapOvr>
+  <mc:AlternateContent xmlns:mc="http://schemas.openxmlformats.org/markup-compatibility/2006">
+    <mc:Choice xmlns:p14="http://schemas.microsoft.com/office/powerpoint/2010/main" Requires="p14">
+      <p:transition spd="slow" p14:dur="2000"/>
+    </mc:Choice>
+    <mc:Fallback>
+      <p:transition spd="slow"/>
+    </mc:Fallback>
+  </mc:AlternateContent>
+</p:sld>
+</file>
+
+<file path=ppt/slides/slide11.xml><?xml version="1.0" encoding="utf-8"?>
+<p:sld xmlns:a="http://schemas.openxmlformats.org/drawingml/2006/main" xmlns:r="http://schemas.openxmlformats.org/officeDocument/2006/relationships" xmlns:p="http://schemas.openxmlformats.org/presentationml/2006/main" show="0">
+  <p:cSld>
+    <p:spTree>
+      <p:nvGrpSpPr>
+        <p:cNvPr id="1" name=""/>
+        <p:cNvGrpSpPr/>
+        <p:nvPr/>
+      </p:nvGrpSpPr>
+      <p:grpSpPr>
+        <a:xfrm>
+          <a:off x="0" y="0"/>
+          <a:ext cx="0" cy="0"/>
+          <a:chOff x="0" y="0"/>
+          <a:chExt cx="0" cy="0"/>
+        </a:xfrm>
+      </p:grpSpPr>
+      <p:sp>
+        <p:nvSpPr>
+          <p:cNvPr id="2" name="Tijdelijke aanduiding voor inhoud 1"/>
+          <p:cNvSpPr>
+            <a:spLocks noGrp="1"/>
+          </p:cNvSpPr>
+          <p:nvPr>
+            <p:ph sz="half" idx="2"/>
+          </p:nvPr>
+        </p:nvSpPr>
+        <p:spPr>
+          <a:xfrm>
+            <a:off x="49213" y="1116438"/>
+            <a:ext cx="8250257" cy="5194127"/>
+          </a:xfrm>
+        </p:spPr>
+        <p:txBody>
+          <a:bodyPr/>
+          <a:lstStyle/>
+          <a:p>
+            <a:r>
+              <a:rPr lang="en-US" dirty="0" err="1"/>
+              <a:t>MouseClick</a:t>
+            </a:r>
+            <a:r>
+              <a:rPr lang="en-US" dirty="0"/>
+              <a:t>()</a:t>
+            </a:r>
+          </a:p>
+          <a:p>
+            <a:pPr lvl="1"/>
+            <a:r>
+              <a:rPr lang="en-US" dirty="0" err="1"/>
+              <a:t>Handels</a:t>
+            </a:r>
+            <a:r>
+              <a:rPr lang="en-US" dirty="0"/>
+              <a:t> mouse input</a:t>
+            </a:r>
+          </a:p>
+          <a:p>
+            <a:pPr lvl="1"/>
+            <a:endParaRPr lang="en-US" dirty="0"/>
+          </a:p>
+          <a:p>
+            <a:endParaRPr lang="nl-NL" dirty="0"/>
+          </a:p>
+        </p:txBody>
+      </p:sp>
+      <p:sp>
+        <p:nvSpPr>
+          <p:cNvPr id="3" name="Ondertitel 2"/>
+          <p:cNvSpPr>
+            <a:spLocks noGrp="1"/>
+          </p:cNvSpPr>
+          <p:nvPr>
+            <p:ph type="subTitle" idx="1"/>
+          </p:nvPr>
+        </p:nvSpPr>
+        <p:spPr/>
+        <p:txBody>
+          <a:bodyPr/>
+          <a:lstStyle/>
+          <a:p>
+            <a:endParaRPr lang="nl-NL"/>
+          </a:p>
+        </p:txBody>
+      </p:sp>
+      <p:sp>
+        <p:nvSpPr>
+          <p:cNvPr id="4" name="Tijdelijke aanduiding voor dianummer 3"/>
+          <p:cNvSpPr>
+            <a:spLocks noGrp="1"/>
+          </p:cNvSpPr>
+          <p:nvPr>
+            <p:ph type="sldNum" sz="quarter" idx="10"/>
+          </p:nvPr>
+        </p:nvSpPr>
+        <p:spPr/>
+        <p:txBody>
+          <a:bodyPr/>
+          <a:lstStyle/>
+          <a:p>
+            <a:fld id="{15A33517-824B-4115-AD3E-16E3532C9CE7}" type="slidenum">
+              <a:rPr lang="nl-NL" altLang="nl-NL" smtClean="0"/>
+              <a:pPr/>
+              <a:t>11</a:t>
+            </a:fld>
+            <a:endParaRPr lang="nl-NL" altLang="nl-NL"/>
+          </a:p>
+        </p:txBody>
+      </p:sp>
+      <p:pic>
+        <p:nvPicPr>
+          <p:cNvPr id="7" name="Afbeelding 6"/>
+          <p:cNvPicPr>
+            <a:picLocks noChangeAspect="1"/>
+          </p:cNvPicPr>
+          <p:nvPr/>
+        </p:nvPicPr>
+        <p:blipFill>
+          <a:blip r:embed="rId2"/>
+          <a:stretch>
+            <a:fillRect/>
+          </a:stretch>
+        </p:blipFill>
+        <p:spPr>
+          <a:xfrm>
+            <a:off x="2868767" y="1828799"/>
+            <a:ext cx="6275233" cy="4926013"/>
+          </a:xfrm>
+          <a:prstGeom prst="rect">
+            <a:avLst/>
+          </a:prstGeom>
+        </p:spPr>
+      </p:pic>
+    </p:spTree>
+    <p:extLst>
+      <p:ext uri="{BB962C8B-B14F-4D97-AF65-F5344CB8AC3E}">
+        <p14:creationId xmlns:p14="http://schemas.microsoft.com/office/powerpoint/2010/main" val="3872516003"/>
+      </p:ext>
+    </p:extLst>
+  </p:cSld>
+  <p:clrMapOvr>
+    <a:masterClrMapping/>
+  </p:clrMapOvr>
+  <mc:AlternateContent xmlns:mc="http://schemas.openxmlformats.org/markup-compatibility/2006">
+    <mc:Choice xmlns:p14="http://schemas.microsoft.com/office/powerpoint/2010/main" Requires="p14">
+      <p:transition spd="slow" p14:dur="2000"/>
+    </mc:Choice>
+    <mc:Fallback>
+      <p:transition spd="slow"/>
+    </mc:Fallback>
+  </mc:AlternateContent>
+</p:sld>
+</file>
+
+<file path=ppt/slides/slide12.xml><?xml version="1.0" encoding="utf-8"?>
 <p:sld xmlns:a="http://schemas.openxmlformats.org/drawingml/2006/main" xmlns:r="http://schemas.openxmlformats.org/officeDocument/2006/relationships" xmlns:p="http://schemas.openxmlformats.org/presentationml/2006/main">
   <p:cSld>
     <p:spTree>
@@ -5485,7 +5978,89 @@
           <a:bodyPr/>
           <a:lstStyle/>
           <a:p>
-            <a:endParaRPr lang="nl-NL"/>
+            <a:r>
+              <a:rPr lang="en-US" dirty="0"/>
+              <a:t>Classes</a:t>
+            </a:r>
+          </a:p>
+          <a:p>
+            <a:pPr lvl="1"/>
+            <a:r>
+              <a:rPr lang="en-US" dirty="0" err="1"/>
+              <a:t>FiredBullet</a:t>
+            </a:r>
+            <a:endParaRPr lang="en-US" dirty="0"/>
+          </a:p>
+          <a:p>
+            <a:pPr lvl="1"/>
+            <a:r>
+              <a:rPr lang="en-US" dirty="0"/>
+              <a:t>Enemy</a:t>
+            </a:r>
+          </a:p>
+          <a:p>
+            <a:pPr lvl="1"/>
+            <a:r>
+              <a:rPr lang="en-US" dirty="0"/>
+              <a:t>Turret</a:t>
+            </a:r>
+          </a:p>
+          <a:p>
+            <a:pPr lvl="1"/>
+            <a:r>
+              <a:rPr lang="en-US" dirty="0" err="1"/>
+              <a:t>Drawable</a:t>
+            </a:r>
+            <a:r>
+              <a:rPr lang="en-US" dirty="0"/>
+              <a:t>: </a:t>
+            </a:r>
+          </a:p>
+          <a:p>
+            <a:pPr lvl="2"/>
+            <a:r>
+              <a:rPr lang="en-US" dirty="0"/>
+              <a:t>Button</a:t>
+            </a:r>
+          </a:p>
+          <a:p>
+            <a:pPr lvl="2"/>
+            <a:r>
+              <a:rPr lang="en-US" dirty="0"/>
+              <a:t>Circle</a:t>
+            </a:r>
+          </a:p>
+          <a:p>
+            <a:pPr lvl="2"/>
+            <a:r>
+              <a:rPr lang="en-US" dirty="0"/>
+              <a:t>Heart (future)</a:t>
+            </a:r>
+          </a:p>
+          <a:p>
+            <a:pPr lvl="2"/>
+            <a:r>
+              <a:rPr lang="en-US" dirty="0"/>
+              <a:t>Line</a:t>
+            </a:r>
+          </a:p>
+          <a:p>
+            <a:pPr lvl="2"/>
+            <a:r>
+              <a:rPr lang="en-US" dirty="0"/>
+              <a:t>Square</a:t>
+            </a:r>
+          </a:p>
+          <a:p>
+            <a:pPr lvl="2"/>
+            <a:r>
+              <a:rPr lang="en-US" dirty="0"/>
+              <a:t>Text </a:t>
+            </a:r>
+          </a:p>
+          <a:p>
+            <a:pPr lvl="1"/>
+            <a:endParaRPr lang="nl-NL" dirty="0"/>
           </a:p>
         </p:txBody>
       </p:sp>
@@ -5506,7 +6081,7 @@
           <a:p>
             <a:r>
               <a:rPr lang="en-US" dirty="0"/>
-              <a:t>Improvements </a:t>
+              <a:t>Features</a:t>
             </a:r>
             <a:endParaRPr lang="nl-NL" dirty="0"/>
           </a:p>
@@ -5530,16 +6105,769 @@
             <a:fld id="{15A33517-824B-4115-AD3E-16E3532C9CE7}" type="slidenum">
               <a:rPr lang="nl-NL" altLang="nl-NL" smtClean="0"/>
               <a:pPr/>
-              <a:t>10</a:t>
+              <a:t>12</a:t>
             </a:fld>
             <a:endParaRPr lang="nl-NL" altLang="nl-NL"/>
           </a:p>
         </p:txBody>
       </p:sp>
+      <p:pic>
+        <p:nvPicPr>
+          <p:cNvPr id="7" name="Afbeelding 6"/>
+          <p:cNvPicPr>
+            <a:picLocks noChangeAspect="1"/>
+          </p:cNvPicPr>
+          <p:nvPr/>
+        </p:nvPicPr>
+        <p:blipFill>
+          <a:blip r:embed="rId2"/>
+          <a:stretch>
+            <a:fillRect/>
+          </a:stretch>
+        </p:blipFill>
+        <p:spPr>
+          <a:xfrm>
+            <a:off x="3526366" y="4044369"/>
+            <a:ext cx="5067300" cy="1066800"/>
+          </a:xfrm>
+          <a:prstGeom prst="rect">
+            <a:avLst/>
+          </a:prstGeom>
+        </p:spPr>
+      </p:pic>
+      <p:pic>
+        <p:nvPicPr>
+          <p:cNvPr id="8" name="Afbeelding 7"/>
+          <p:cNvPicPr>
+            <a:picLocks noChangeAspect="1"/>
+          </p:cNvPicPr>
+          <p:nvPr/>
+        </p:nvPicPr>
+        <p:blipFill>
+          <a:blip r:embed="rId3"/>
+          <a:stretch>
+            <a:fillRect/>
+          </a:stretch>
+        </p:blipFill>
+        <p:spPr>
+          <a:xfrm>
+            <a:off x="5856551" y="1345792"/>
+            <a:ext cx="1123950" cy="1209675"/>
+          </a:xfrm>
+          <a:prstGeom prst="rect">
+            <a:avLst/>
+          </a:prstGeom>
+        </p:spPr>
+      </p:pic>
+      <p:pic>
+        <p:nvPicPr>
+          <p:cNvPr id="9" name="Afbeelding 8"/>
+          <p:cNvPicPr>
+            <a:picLocks noChangeAspect="1"/>
+          </p:cNvPicPr>
+          <p:nvPr/>
+        </p:nvPicPr>
+        <p:blipFill>
+          <a:blip r:embed="rId4"/>
+          <a:stretch>
+            <a:fillRect/>
+          </a:stretch>
+        </p:blipFill>
+        <p:spPr>
+          <a:xfrm>
+            <a:off x="3526366" y="1345792"/>
+            <a:ext cx="1247775" cy="1485900"/>
+          </a:xfrm>
+          <a:prstGeom prst="rect">
+            <a:avLst/>
+          </a:prstGeom>
+        </p:spPr>
+      </p:pic>
+      <p:pic>
+        <p:nvPicPr>
+          <p:cNvPr id="10" name="Afbeelding 9"/>
+          <p:cNvPicPr>
+            <a:picLocks noChangeAspect="1"/>
+          </p:cNvPicPr>
+          <p:nvPr/>
+        </p:nvPicPr>
+        <p:blipFill>
+          <a:blip r:embed="rId5"/>
+          <a:stretch>
+            <a:fillRect/>
+          </a:stretch>
+        </p:blipFill>
+        <p:spPr>
+          <a:xfrm>
+            <a:off x="4774141" y="1349801"/>
+            <a:ext cx="1076325" cy="1343025"/>
+          </a:xfrm>
+          <a:prstGeom prst="rect">
+            <a:avLst/>
+          </a:prstGeom>
+        </p:spPr>
+      </p:pic>
     </p:spTree>
     <p:extLst>
       <p:ext uri="{BB962C8B-B14F-4D97-AF65-F5344CB8AC3E}">
-        <p14:creationId xmlns:p14="http://schemas.microsoft.com/office/powerpoint/2010/main" val="2069838768"/>
+        <p14:creationId xmlns:p14="http://schemas.microsoft.com/office/powerpoint/2010/main" val="1556357675"/>
+      </p:ext>
+    </p:extLst>
+  </p:cSld>
+  <p:clrMapOvr>
+    <a:masterClrMapping/>
+  </p:clrMapOvr>
+</p:sld>
+</file>
+
+<file path=ppt/slides/slide13.xml><?xml version="1.0" encoding="utf-8"?>
+<p:sld xmlns:a="http://schemas.openxmlformats.org/drawingml/2006/main" xmlns:r="http://schemas.openxmlformats.org/officeDocument/2006/relationships" xmlns:p="http://schemas.openxmlformats.org/presentationml/2006/main">
+  <p:cSld>
+    <p:spTree>
+      <p:nvGrpSpPr>
+        <p:cNvPr id="1" name=""/>
+        <p:cNvGrpSpPr/>
+        <p:nvPr/>
+      </p:nvGrpSpPr>
+      <p:grpSpPr>
+        <a:xfrm>
+          <a:off x="0" y="0"/>
+          <a:ext cx="0" cy="0"/>
+          <a:chOff x="0" y="0"/>
+          <a:chExt cx="0" cy="0"/>
+        </a:xfrm>
+      </p:grpSpPr>
+      <p:sp>
+        <p:nvSpPr>
+          <p:cNvPr id="2" name="Tijdelijke aanduiding voor inhoud 1"/>
+          <p:cNvSpPr>
+            <a:spLocks noGrp="1"/>
+          </p:cNvSpPr>
+          <p:nvPr>
+            <p:ph sz="half" idx="2"/>
+          </p:nvPr>
+        </p:nvSpPr>
+        <p:spPr/>
+        <p:txBody>
+          <a:bodyPr/>
+          <a:lstStyle/>
+          <a:p>
+            <a:r>
+              <a:rPr lang="en-US" dirty="0"/>
+              <a:t>Extra features</a:t>
+            </a:r>
+          </a:p>
+          <a:p>
+            <a:pPr lvl="1"/>
+            <a:r>
+              <a:rPr lang="en-US" dirty="0"/>
+              <a:t>Sound effects</a:t>
+            </a:r>
+          </a:p>
+          <a:p>
+            <a:pPr lvl="1"/>
+            <a:r>
+              <a:rPr lang="en-US" dirty="0"/>
+              <a:t>Multiple maps</a:t>
+            </a:r>
+          </a:p>
+          <a:p>
+            <a:pPr lvl="1"/>
+            <a:r>
+              <a:rPr lang="en-US" dirty="0"/>
+              <a:t>Button’s</a:t>
+            </a:r>
+          </a:p>
+          <a:p>
+            <a:pPr lvl="1"/>
+            <a:r>
+              <a:rPr lang="en-US" dirty="0"/>
+              <a:t>Mouse input</a:t>
+            </a:r>
+          </a:p>
+          <a:p>
+            <a:pPr lvl="1"/>
+            <a:r>
+              <a:rPr lang="en-US" dirty="0"/>
+              <a:t>Keyboard input</a:t>
+            </a:r>
+          </a:p>
+          <a:p>
+            <a:pPr lvl="1"/>
+            <a:r>
+              <a:rPr lang="en-US" dirty="0"/>
+              <a:t>GLUT window input</a:t>
+            </a:r>
+          </a:p>
+          <a:p>
+            <a:pPr lvl="1"/>
+            <a:endParaRPr lang="en-US" dirty="0"/>
+          </a:p>
+          <a:p>
+            <a:pPr lvl="1"/>
+            <a:endParaRPr lang="nl-NL" dirty="0"/>
+          </a:p>
+        </p:txBody>
+      </p:sp>
+      <p:sp>
+        <p:nvSpPr>
+          <p:cNvPr id="3" name="Ondertitel 2"/>
+          <p:cNvSpPr>
+            <a:spLocks noGrp="1"/>
+          </p:cNvSpPr>
+          <p:nvPr>
+            <p:ph type="subTitle" idx="1"/>
+          </p:nvPr>
+        </p:nvSpPr>
+        <p:spPr/>
+        <p:txBody>
+          <a:bodyPr/>
+          <a:lstStyle/>
+          <a:p>
+            <a:r>
+              <a:rPr lang="en-US" dirty="0"/>
+              <a:t>Additional</a:t>
+            </a:r>
+            <a:r>
+              <a:rPr lang="nl-NL" dirty="0"/>
+              <a:t> features</a:t>
+            </a:r>
+          </a:p>
+        </p:txBody>
+      </p:sp>
+      <p:sp>
+        <p:nvSpPr>
+          <p:cNvPr id="4" name="Tijdelijke aanduiding voor dianummer 3"/>
+          <p:cNvSpPr>
+            <a:spLocks noGrp="1"/>
+          </p:cNvSpPr>
+          <p:nvPr>
+            <p:ph type="sldNum" sz="quarter" idx="10"/>
+          </p:nvPr>
+        </p:nvSpPr>
+        <p:spPr/>
+        <p:txBody>
+          <a:bodyPr/>
+          <a:lstStyle/>
+          <a:p>
+            <a:fld id="{15A33517-824B-4115-AD3E-16E3532C9CE7}" type="slidenum">
+              <a:rPr lang="nl-NL" altLang="nl-NL" smtClean="0"/>
+              <a:pPr/>
+              <a:t>13</a:t>
+            </a:fld>
+            <a:endParaRPr lang="nl-NL" altLang="nl-NL"/>
+          </a:p>
+        </p:txBody>
+      </p:sp>
+    </p:spTree>
+    <p:extLst>
+      <p:ext uri="{BB962C8B-B14F-4D97-AF65-F5344CB8AC3E}">
+        <p14:creationId xmlns:p14="http://schemas.microsoft.com/office/powerpoint/2010/main" val="3668084297"/>
+      </p:ext>
+    </p:extLst>
+  </p:cSld>
+  <p:clrMapOvr>
+    <a:masterClrMapping/>
+  </p:clrMapOvr>
+</p:sld>
+</file>
+
+<file path=ppt/slides/slide14.xml><?xml version="1.0" encoding="utf-8"?>
+<p:sld xmlns:a="http://schemas.openxmlformats.org/drawingml/2006/main" xmlns:r="http://schemas.openxmlformats.org/officeDocument/2006/relationships" xmlns:p="http://schemas.openxmlformats.org/presentationml/2006/main">
+  <p:cSld>
+    <p:spTree>
+      <p:nvGrpSpPr>
+        <p:cNvPr id="1" name=""/>
+        <p:cNvGrpSpPr/>
+        <p:nvPr/>
+      </p:nvGrpSpPr>
+      <p:grpSpPr>
+        <a:xfrm>
+          <a:off x="0" y="0"/>
+          <a:ext cx="0" cy="0"/>
+          <a:chOff x="0" y="0"/>
+          <a:chExt cx="0" cy="0"/>
+        </a:xfrm>
+      </p:grpSpPr>
+      <p:sp>
+        <p:nvSpPr>
+          <p:cNvPr id="2" name="Tijdelijke aanduiding voor inhoud 1"/>
+          <p:cNvSpPr>
+            <a:spLocks noGrp="1"/>
+          </p:cNvSpPr>
+          <p:nvPr>
+            <p:ph sz="half" idx="2"/>
+          </p:nvPr>
+        </p:nvSpPr>
+        <p:spPr/>
+        <p:txBody>
+          <a:bodyPr/>
+          <a:lstStyle/>
+          <a:p>
+            <a:r>
+              <a:rPr lang="en-US" dirty="0"/>
+              <a:t>Improvements that can be made</a:t>
+            </a:r>
+          </a:p>
+          <a:p>
+            <a:pPr lvl="1"/>
+            <a:r>
+              <a:rPr lang="en-US" dirty="0"/>
+              <a:t>Aim algorithm</a:t>
+            </a:r>
+          </a:p>
+          <a:p>
+            <a:pPr lvl="2"/>
+            <a:r>
+              <a:rPr lang="en-US" dirty="0"/>
+              <a:t>More predictive aiming</a:t>
+            </a:r>
+          </a:p>
+          <a:p>
+            <a:pPr lvl="1"/>
+            <a:r>
+              <a:rPr lang="en-US" dirty="0"/>
+              <a:t>Walk algorithm </a:t>
+            </a:r>
+          </a:p>
+          <a:p>
+            <a:pPr lvl="2"/>
+            <a:r>
+              <a:rPr lang="en-US" dirty="0"/>
+              <a:t>Implement A* </a:t>
+            </a:r>
+          </a:p>
+          <a:p>
+            <a:pPr lvl="2"/>
+            <a:endParaRPr lang="nl-NL" dirty="0"/>
+          </a:p>
+        </p:txBody>
+      </p:sp>
+      <p:sp>
+        <p:nvSpPr>
+          <p:cNvPr id="3" name="Ondertitel 2"/>
+          <p:cNvSpPr>
+            <a:spLocks noGrp="1"/>
+          </p:cNvSpPr>
+          <p:nvPr>
+            <p:ph type="subTitle" idx="1"/>
+          </p:nvPr>
+        </p:nvSpPr>
+        <p:spPr/>
+        <p:txBody>
+          <a:bodyPr/>
+          <a:lstStyle/>
+          <a:p>
+            <a:r>
+              <a:rPr lang="en-US" dirty="0"/>
+              <a:t>Improvements to be made</a:t>
+            </a:r>
+            <a:endParaRPr lang="nl-NL" dirty="0"/>
+          </a:p>
+        </p:txBody>
+      </p:sp>
+      <p:sp>
+        <p:nvSpPr>
+          <p:cNvPr id="4" name="Tijdelijke aanduiding voor dianummer 3"/>
+          <p:cNvSpPr>
+            <a:spLocks noGrp="1"/>
+          </p:cNvSpPr>
+          <p:nvPr>
+            <p:ph type="sldNum" sz="quarter" idx="10"/>
+          </p:nvPr>
+        </p:nvSpPr>
+        <p:spPr/>
+        <p:txBody>
+          <a:bodyPr/>
+          <a:lstStyle/>
+          <a:p>
+            <a:fld id="{15A33517-824B-4115-AD3E-16E3532C9CE7}" type="slidenum">
+              <a:rPr lang="nl-NL" altLang="nl-NL" smtClean="0"/>
+              <a:pPr/>
+              <a:t>14</a:t>
+            </a:fld>
+            <a:endParaRPr lang="nl-NL" altLang="nl-NL"/>
+          </a:p>
+        </p:txBody>
+      </p:sp>
+    </p:spTree>
+    <p:extLst>
+      <p:ext uri="{BB962C8B-B14F-4D97-AF65-F5344CB8AC3E}">
+        <p14:creationId xmlns:p14="http://schemas.microsoft.com/office/powerpoint/2010/main" val="2476471645"/>
+      </p:ext>
+    </p:extLst>
+  </p:cSld>
+  <p:clrMapOvr>
+    <a:masterClrMapping/>
+  </p:clrMapOvr>
+</p:sld>
+</file>
+
+<file path=ppt/slides/slide15.xml><?xml version="1.0" encoding="utf-8"?>
+<p:sld xmlns:a="http://schemas.openxmlformats.org/drawingml/2006/main" xmlns:r="http://schemas.openxmlformats.org/officeDocument/2006/relationships" xmlns:p="http://schemas.openxmlformats.org/presentationml/2006/main">
+  <p:cSld>
+    <p:spTree>
+      <p:nvGrpSpPr>
+        <p:cNvPr id="1" name=""/>
+        <p:cNvGrpSpPr/>
+        <p:nvPr/>
+      </p:nvGrpSpPr>
+      <p:grpSpPr>
+        <a:xfrm>
+          <a:off x="0" y="0"/>
+          <a:ext cx="0" cy="0"/>
+          <a:chOff x="0" y="0"/>
+          <a:chExt cx="0" cy="0"/>
+        </a:xfrm>
+      </p:grpSpPr>
+      <p:sp>
+        <p:nvSpPr>
+          <p:cNvPr id="2" name="Tijdelijke aanduiding voor inhoud 1"/>
+          <p:cNvSpPr>
+            <a:spLocks noGrp="1"/>
+          </p:cNvSpPr>
+          <p:nvPr>
+            <p:ph sz="half" idx="2"/>
+          </p:nvPr>
+        </p:nvSpPr>
+        <p:spPr/>
+        <p:txBody>
+          <a:bodyPr/>
+          <a:lstStyle/>
+          <a:p>
+            <a:r>
+              <a:rPr lang="en-US" dirty="0"/>
+              <a:t>Conclusion</a:t>
+            </a:r>
+          </a:p>
+          <a:p>
+            <a:pPr lvl="1"/>
+            <a:r>
+              <a:rPr lang="en-US" dirty="0"/>
+              <a:t>Fun to program C++</a:t>
+            </a:r>
+          </a:p>
+          <a:p>
+            <a:pPr lvl="1"/>
+            <a:r>
+              <a:rPr lang="en-US" dirty="0"/>
+              <a:t>C++ is very extensible and fast</a:t>
+            </a:r>
+          </a:p>
+          <a:p>
+            <a:pPr lvl="1"/>
+            <a:r>
+              <a:rPr lang="en-US" dirty="0"/>
+              <a:t>C++ &amp; GLUT can be cumbersome</a:t>
+            </a:r>
+          </a:p>
+          <a:p>
+            <a:pPr lvl="1"/>
+            <a:endParaRPr lang="en-US" dirty="0"/>
+          </a:p>
+          <a:p>
+            <a:endParaRPr lang="en-US" dirty="0"/>
+          </a:p>
+        </p:txBody>
+      </p:sp>
+      <p:sp>
+        <p:nvSpPr>
+          <p:cNvPr id="3" name="Ondertitel 2"/>
+          <p:cNvSpPr>
+            <a:spLocks noGrp="1"/>
+          </p:cNvSpPr>
+          <p:nvPr>
+            <p:ph type="subTitle" idx="1"/>
+          </p:nvPr>
+        </p:nvSpPr>
+        <p:spPr/>
+        <p:txBody>
+          <a:bodyPr/>
+          <a:lstStyle/>
+          <a:p>
+            <a:r>
+              <a:rPr lang="en-US" dirty="0"/>
+              <a:t>Conclude</a:t>
+            </a:r>
+            <a:endParaRPr lang="nl-NL" dirty="0"/>
+          </a:p>
+        </p:txBody>
+      </p:sp>
+      <p:sp>
+        <p:nvSpPr>
+          <p:cNvPr id="4" name="Tijdelijke aanduiding voor dianummer 3"/>
+          <p:cNvSpPr>
+            <a:spLocks noGrp="1"/>
+          </p:cNvSpPr>
+          <p:nvPr>
+            <p:ph type="sldNum" sz="quarter" idx="10"/>
+          </p:nvPr>
+        </p:nvSpPr>
+        <p:spPr/>
+        <p:txBody>
+          <a:bodyPr/>
+          <a:lstStyle/>
+          <a:p>
+            <a:fld id="{15A33517-824B-4115-AD3E-16E3532C9CE7}" type="slidenum">
+              <a:rPr lang="nl-NL" altLang="nl-NL" smtClean="0"/>
+              <a:pPr/>
+              <a:t>15</a:t>
+            </a:fld>
+            <a:endParaRPr lang="nl-NL" altLang="nl-NL"/>
+          </a:p>
+        </p:txBody>
+      </p:sp>
+    </p:spTree>
+    <p:extLst>
+      <p:ext uri="{BB962C8B-B14F-4D97-AF65-F5344CB8AC3E}">
+        <p14:creationId xmlns:p14="http://schemas.microsoft.com/office/powerpoint/2010/main" val="1604547528"/>
+      </p:ext>
+    </p:extLst>
+  </p:cSld>
+  <p:clrMapOvr>
+    <a:masterClrMapping/>
+  </p:clrMapOvr>
+</p:sld>
+</file>
+
+<file path=ppt/slides/slide16.xml><?xml version="1.0" encoding="utf-8"?>
+<p:sld xmlns:a="http://schemas.openxmlformats.org/drawingml/2006/main" xmlns:r="http://schemas.openxmlformats.org/officeDocument/2006/relationships" xmlns:p="http://schemas.openxmlformats.org/presentationml/2006/main">
+  <p:cSld>
+    <p:spTree>
+      <p:nvGrpSpPr>
+        <p:cNvPr id="1" name=""/>
+        <p:cNvGrpSpPr/>
+        <p:nvPr/>
+      </p:nvGrpSpPr>
+      <p:grpSpPr>
+        <a:xfrm>
+          <a:off x="0" y="0"/>
+          <a:ext cx="0" cy="0"/>
+          <a:chOff x="0" y="0"/>
+          <a:chExt cx="0" cy="0"/>
+        </a:xfrm>
+      </p:grpSpPr>
+      <p:sp>
+        <p:nvSpPr>
+          <p:cNvPr id="2" name="Tijdelijke aanduiding voor inhoud 1"/>
+          <p:cNvSpPr>
+            <a:spLocks noGrp="1"/>
+          </p:cNvSpPr>
+          <p:nvPr>
+            <p:ph sz="half" idx="2"/>
+          </p:nvPr>
+        </p:nvSpPr>
+        <p:spPr/>
+        <p:txBody>
+          <a:bodyPr/>
+          <a:lstStyle/>
+          <a:p>
+            <a:r>
+              <a:rPr lang="en-US" dirty="0"/>
+              <a:t>Are there any questions ?</a:t>
+            </a:r>
+            <a:endParaRPr lang="nl-NL" dirty="0"/>
+          </a:p>
+        </p:txBody>
+      </p:sp>
+      <p:sp>
+        <p:nvSpPr>
+          <p:cNvPr id="3" name="Ondertitel 2"/>
+          <p:cNvSpPr>
+            <a:spLocks noGrp="1"/>
+          </p:cNvSpPr>
+          <p:nvPr>
+            <p:ph type="subTitle" idx="1"/>
+          </p:nvPr>
+        </p:nvSpPr>
+        <p:spPr/>
+        <p:txBody>
+          <a:bodyPr/>
+          <a:lstStyle/>
+          <a:p>
+            <a:r>
+              <a:rPr lang="en-US" dirty="0"/>
+              <a:t>Questions</a:t>
+            </a:r>
+            <a:endParaRPr lang="nl-NL" dirty="0"/>
+          </a:p>
+        </p:txBody>
+      </p:sp>
+      <p:sp>
+        <p:nvSpPr>
+          <p:cNvPr id="4" name="Tijdelijke aanduiding voor dianummer 3"/>
+          <p:cNvSpPr>
+            <a:spLocks noGrp="1"/>
+          </p:cNvSpPr>
+          <p:nvPr>
+            <p:ph type="sldNum" sz="quarter" idx="10"/>
+          </p:nvPr>
+        </p:nvSpPr>
+        <p:spPr/>
+        <p:txBody>
+          <a:bodyPr/>
+          <a:lstStyle/>
+          <a:p>
+            <a:fld id="{15A33517-824B-4115-AD3E-16E3532C9CE7}" type="slidenum">
+              <a:rPr lang="nl-NL" altLang="nl-NL" smtClean="0"/>
+              <a:pPr/>
+              <a:t>16</a:t>
+            </a:fld>
+            <a:endParaRPr lang="nl-NL" altLang="nl-NL"/>
+          </a:p>
+        </p:txBody>
+      </p:sp>
+      <p:pic>
+        <p:nvPicPr>
+          <p:cNvPr id="1028" name="Picture 4" descr="http://espei.com/wp-content/uploads/2013/05/equipmentprotection3.png"/>
+          <p:cNvPicPr>
+            <a:picLocks noChangeAspect="1" noChangeArrowheads="1"/>
+          </p:cNvPicPr>
+          <p:nvPr/>
+        </p:nvPicPr>
+        <p:blipFill>
+          <a:blip r:embed="rId2">
+            <a:extLst>
+              <a:ext uri="{28A0092B-C50C-407E-A947-70E740481C1C}">
+                <a14:useLocalDpi xmlns:a14="http://schemas.microsoft.com/office/drawing/2010/main" val="0"/>
+              </a:ext>
+            </a:extLst>
+          </a:blip>
+          <a:srcRect/>
+          <a:stretch>
+            <a:fillRect/>
+          </a:stretch>
+        </p:blipFill>
+        <p:spPr bwMode="auto">
+          <a:xfrm>
+            <a:off x="2284137" y="2104138"/>
+            <a:ext cx="4368800" cy="4368801"/>
+          </a:xfrm>
+          <a:prstGeom prst="rect">
+            <a:avLst/>
+          </a:prstGeom>
+          <a:noFill/>
+          <a:extLst>
+            <a:ext uri="{909E8E84-426E-40DD-AFC4-6F175D3DCCD1}">
+              <a14:hiddenFill xmlns:a14="http://schemas.microsoft.com/office/drawing/2010/main">
+                <a:solidFill>
+                  <a:srgbClr val="FFFFFF"/>
+                </a:solidFill>
+              </a14:hiddenFill>
+            </a:ext>
+          </a:extLst>
+        </p:spPr>
+      </p:pic>
+    </p:spTree>
+    <p:extLst>
+      <p:ext uri="{BB962C8B-B14F-4D97-AF65-F5344CB8AC3E}">
+        <p14:creationId xmlns:p14="http://schemas.microsoft.com/office/powerpoint/2010/main" val="973298141"/>
+      </p:ext>
+    </p:extLst>
+  </p:cSld>
+  <p:clrMapOvr>
+    <a:masterClrMapping/>
+  </p:clrMapOvr>
+</p:sld>
+</file>
+
+<file path=ppt/slides/slide17.xml><?xml version="1.0" encoding="utf-8"?>
+<p:sld xmlns:a="http://schemas.openxmlformats.org/drawingml/2006/main" xmlns:r="http://schemas.openxmlformats.org/officeDocument/2006/relationships" xmlns:p="http://schemas.openxmlformats.org/presentationml/2006/main">
+  <p:cSld>
+    <p:spTree>
+      <p:nvGrpSpPr>
+        <p:cNvPr id="1" name=""/>
+        <p:cNvGrpSpPr/>
+        <p:nvPr/>
+      </p:nvGrpSpPr>
+      <p:grpSpPr>
+        <a:xfrm>
+          <a:off x="0" y="0"/>
+          <a:ext cx="0" cy="0"/>
+          <a:chOff x="0" y="0"/>
+          <a:chExt cx="0" cy="0"/>
+        </a:xfrm>
+      </p:grpSpPr>
+      <p:sp>
+        <p:nvSpPr>
+          <p:cNvPr id="2" name="Tijdelijke aanduiding voor inhoud 1"/>
+          <p:cNvSpPr>
+            <a:spLocks noGrp="1"/>
+          </p:cNvSpPr>
+          <p:nvPr>
+            <p:ph sz="half" idx="2"/>
+          </p:nvPr>
+        </p:nvSpPr>
+        <p:spPr/>
+        <p:txBody>
+          <a:bodyPr/>
+          <a:lstStyle/>
+          <a:p>
+            <a:r>
+              <a:rPr lang="en-US" dirty="0">
+                <a:hlinkClick r:id="rId2" action="ppaction://program"/>
+              </a:rPr>
+              <a:t>Demo</a:t>
+            </a:r>
+            <a:endParaRPr lang="en-US" dirty="0"/>
+          </a:p>
+          <a:p>
+            <a:pPr lvl="1"/>
+            <a:endParaRPr lang="nl-NL" dirty="0"/>
+          </a:p>
+        </p:txBody>
+      </p:sp>
+      <p:sp>
+        <p:nvSpPr>
+          <p:cNvPr id="3" name="Ondertitel 2"/>
+          <p:cNvSpPr>
+            <a:spLocks noGrp="1"/>
+          </p:cNvSpPr>
+          <p:nvPr>
+            <p:ph type="subTitle" idx="1"/>
+          </p:nvPr>
+        </p:nvSpPr>
+        <p:spPr/>
+        <p:txBody>
+          <a:bodyPr/>
+          <a:lstStyle/>
+          <a:p>
+            <a:r>
+              <a:rPr lang="en-US" dirty="0"/>
+              <a:t>Demo</a:t>
+            </a:r>
+            <a:endParaRPr lang="nl-NL" dirty="0"/>
+          </a:p>
+        </p:txBody>
+      </p:sp>
+      <p:sp>
+        <p:nvSpPr>
+          <p:cNvPr id="4" name="Tijdelijke aanduiding voor dianummer 3"/>
+          <p:cNvSpPr>
+            <a:spLocks noGrp="1"/>
+          </p:cNvSpPr>
+          <p:nvPr>
+            <p:ph type="sldNum" sz="quarter" idx="10"/>
+          </p:nvPr>
+        </p:nvSpPr>
+        <p:spPr/>
+        <p:txBody>
+          <a:bodyPr/>
+          <a:lstStyle/>
+          <a:p>
+            <a:fld id="{15A33517-824B-4115-AD3E-16E3532C9CE7}" type="slidenum">
+              <a:rPr lang="nl-NL" altLang="nl-NL" smtClean="0"/>
+              <a:pPr/>
+              <a:t>17</a:t>
+            </a:fld>
+            <a:endParaRPr lang="nl-NL" altLang="nl-NL"/>
+          </a:p>
+        </p:txBody>
+      </p:sp>
+    </p:spTree>
+    <p:extLst>
+      <p:ext uri="{BB962C8B-B14F-4D97-AF65-F5344CB8AC3E}">
+        <p14:creationId xmlns:p14="http://schemas.microsoft.com/office/powerpoint/2010/main" val="986257339"/>
       </p:ext>
     </p:extLst>
   </p:cSld>
@@ -5583,20 +6911,20 @@
           <a:p>
             <a:r>
               <a:rPr lang="en-US" dirty="0"/>
-              <a:t>Linux hobbyist </a:t>
+              <a:t>Second year Electrical Engineering student</a:t>
             </a:r>
           </a:p>
           <a:p>
             <a:r>
               <a:rPr lang="en-US" dirty="0"/>
-              <a:t>Experience with :</a:t>
+              <a:t>Program experience:</a:t>
             </a:r>
           </a:p>
           <a:p>
             <a:pPr lvl="1"/>
             <a:r>
               <a:rPr lang="en-US" dirty="0"/>
-              <a:t>Python 2.7 (Spare time)</a:t>
+              <a:t>Python (2.7)</a:t>
             </a:r>
           </a:p>
           <a:p>
@@ -5614,10 +6942,39 @@
             </a:r>
           </a:p>
           <a:p>
-            <a:pPr marL="457200" lvl="1" indent="0">
-              <a:buNone/>
-            </a:pPr>
-            <a:endParaRPr lang="en-US" dirty="0"/>
+            <a:pPr lvl="1"/>
+            <a:r>
+              <a:rPr lang="en-US" dirty="0"/>
+              <a:t>C ( Computation </a:t>
+            </a:r>
+            <a:r>
+              <a:rPr lang="ro-RO" dirty="0"/>
+              <a:t>I</a:t>
+            </a:r>
+            <a:r>
+              <a:rPr lang="en-US" dirty="0"/>
+              <a:t> )</a:t>
+            </a:r>
+          </a:p>
+          <a:p>
+            <a:pPr lvl="1"/>
+            <a:r>
+              <a:rPr lang="en-US" dirty="0"/>
+              <a:t>Arduino</a:t>
+            </a:r>
+          </a:p>
+          <a:p>
+            <a:r>
+              <a:rPr lang="en-US" dirty="0"/>
+              <a:t>Linux </a:t>
+            </a:r>
+          </a:p>
+          <a:p>
+            <a:pPr lvl="1"/>
+            <a:r>
+              <a:rPr lang="en-US" dirty="0"/>
+              <a:t>Raspberry Pi</a:t>
+            </a:r>
           </a:p>
           <a:p>
             <a:pPr lvl="1"/>
@@ -5719,15 +7076,78 @@
           <a:p>
             <a:r>
               <a:rPr lang="en-US" dirty="0"/>
-              <a:t>Presentation will focus on : </a:t>
-            </a:r>
-          </a:p>
-          <a:p>
-            <a:pPr marL="914400" lvl="1" indent="-457200">
-              <a:buFont typeface="+mj-lt"/>
-              <a:buAutoNum type="arabicPeriod"/>
+              <a:t>Contents of the Presentation</a:t>
+            </a:r>
+            <a:endParaRPr lang="nl-NL" dirty="0"/>
+          </a:p>
+          <a:p>
+            <a:pPr lvl="1"/>
+            <a:r>
+              <a:rPr lang="en-US" dirty="0"/>
+              <a:t>Game overview</a:t>
+            </a:r>
+          </a:p>
+          <a:p>
+            <a:pPr lvl="1"/>
+            <a:r>
+              <a:rPr lang="en-US" dirty="0"/>
+              <a:t>Library includes</a:t>
+            </a:r>
+          </a:p>
+          <a:p>
+            <a:pPr lvl="1"/>
+            <a:r>
+              <a:rPr lang="en-US" dirty="0"/>
+              <a:t>Overview of main program</a:t>
+            </a:r>
+          </a:p>
+          <a:p>
+            <a:pPr lvl="1"/>
+            <a:r>
+              <a:rPr lang="en-US" dirty="0"/>
+              <a:t>Classes used</a:t>
+            </a:r>
+          </a:p>
+          <a:p>
+            <a:pPr lvl="1"/>
+            <a:r>
+              <a:rPr lang="en-US" dirty="0"/>
+              <a:t>Additional features that have been implemented </a:t>
+            </a:r>
+          </a:p>
+          <a:p>
+            <a:pPr lvl="1"/>
+            <a:r>
+              <a:rPr lang="en-US" dirty="0"/>
+              <a:t>Improvements that can be made</a:t>
+            </a:r>
+          </a:p>
+          <a:p>
+            <a:pPr lvl="1"/>
+            <a:r>
+              <a:rPr lang="en-US" dirty="0"/>
+              <a:t>Conclusion</a:t>
+            </a:r>
+          </a:p>
+          <a:p>
+            <a:pPr lvl="1"/>
+            <a:r>
+              <a:rPr lang="en-US" dirty="0"/>
+              <a:t>Questions</a:t>
+            </a:r>
+          </a:p>
+          <a:p>
+            <a:pPr lvl="1"/>
+            <a:r>
+              <a:rPr lang="en-US" dirty="0"/>
+              <a:t>Demonstration of the game</a:t>
+            </a:r>
+          </a:p>
+          <a:p>
+            <a:pPr marL="914400" lvl="2" indent="0">
+              <a:buNone/>
             </a:pPr>
-            <a:endParaRPr lang="nl-NL" dirty="0"/>
+            <a:endParaRPr lang="en-US" dirty="0"/>
           </a:p>
         </p:txBody>
       </p:sp>
@@ -5747,10 +7167,9 @@
           <a:lstStyle/>
           <a:p>
             <a:r>
-              <a:rPr lang="en-US" dirty="0"/>
+              <a:rPr lang="nl-NL" dirty="0"/>
               <a:t>Contents</a:t>
             </a:r>
-            <a:endParaRPr lang="nl-NL" dirty="0"/>
           </a:p>
         </p:txBody>
       </p:sp>
@@ -5781,7 +7200,7 @@
     </p:spTree>
     <p:extLst>
       <p:ext uri="{BB962C8B-B14F-4D97-AF65-F5344CB8AC3E}">
-        <p14:creationId xmlns:p14="http://schemas.microsoft.com/office/powerpoint/2010/main" val="3019829038"/>
+        <p14:creationId xmlns:p14="http://schemas.microsoft.com/office/powerpoint/2010/main" val="2720603056"/>
       </p:ext>
     </p:extLst>
   </p:cSld>
@@ -5808,60 +7227,15 @@
           <a:chExt cx="0" cy="0"/>
         </a:xfrm>
       </p:grpSpPr>
-      <p:sp>
-        <p:nvSpPr>
-          <p:cNvPr id="3" name="Ondertitel 2"/>
-          <p:cNvSpPr>
-            <a:spLocks noGrp="1"/>
-          </p:cNvSpPr>
-          <p:nvPr>
-            <p:ph type="subTitle" idx="1"/>
-          </p:nvPr>
-        </p:nvSpPr>
-        <p:spPr/>
-        <p:txBody>
-          <a:bodyPr/>
-          <a:lstStyle/>
-          <a:p>
-            <a:r>
-              <a:rPr lang="en-US" dirty="0"/>
-              <a:t>Overview Code I Main</a:t>
-            </a:r>
-            <a:endParaRPr lang="nl-NL" dirty="0"/>
-          </a:p>
-        </p:txBody>
-      </p:sp>
-      <p:sp>
-        <p:nvSpPr>
-          <p:cNvPr id="4" name="Tijdelijke aanduiding voor dianummer 3"/>
-          <p:cNvSpPr>
-            <a:spLocks noGrp="1"/>
-          </p:cNvSpPr>
-          <p:nvPr>
-            <p:ph type="sldNum" sz="quarter" idx="10"/>
-          </p:nvPr>
-        </p:nvSpPr>
-        <p:spPr/>
-        <p:txBody>
-          <a:bodyPr/>
-          <a:lstStyle/>
-          <a:p>
-            <a:fld id="{15A33517-824B-4115-AD3E-16E3532C9CE7}" type="slidenum">
-              <a:rPr lang="nl-NL" altLang="nl-NL" smtClean="0"/>
-              <a:pPr/>
-              <a:t>4</a:t>
-            </a:fld>
-            <a:endParaRPr lang="nl-NL" altLang="nl-NL"/>
-          </a:p>
-        </p:txBody>
-      </p:sp>
       <p:pic>
         <p:nvPicPr>
-          <p:cNvPr id="6" name="Afbeelding 5"/>
+          <p:cNvPr id="5" name="Tijdelijke aanduiding voor inhoud 4"/>
           <p:cNvPicPr>
-            <a:picLocks noChangeAspect="1"/>
+            <a:picLocks noGrp="1" noChangeAspect="1"/>
           </p:cNvPicPr>
-          <p:nvPr/>
+          <p:nvPr>
+            <p:ph sz="half" idx="2"/>
+          </p:nvPr>
         </p:nvPicPr>
         <p:blipFill>
           <a:blip r:embed="rId2"/>
@@ -5871,119 +7245,239 @@
         </p:blipFill>
         <p:spPr>
           <a:xfrm>
-            <a:off x="2714821" y="358774"/>
-            <a:ext cx="6429179" cy="6396039"/>
+            <a:off x="49213" y="539750"/>
+            <a:ext cx="6661689" cy="5194300"/>
+          </a:xfrm>
+        </p:spPr>
+      </p:pic>
+      <p:sp>
+        <p:nvSpPr>
+          <p:cNvPr id="3" name="Ondertitel 2"/>
+          <p:cNvSpPr>
+            <a:spLocks noGrp="1"/>
+          </p:cNvSpPr>
+          <p:nvPr>
+            <p:ph type="subTitle" idx="1"/>
+          </p:nvPr>
+        </p:nvSpPr>
+        <p:spPr/>
+        <p:txBody>
+          <a:bodyPr/>
+          <a:lstStyle/>
+          <a:p>
+            <a:r>
+              <a:rPr lang="en-US" dirty="0"/>
+              <a:t>Overview of the game</a:t>
+            </a:r>
+            <a:endParaRPr lang="nl-NL" dirty="0"/>
+          </a:p>
+        </p:txBody>
+      </p:sp>
+      <p:sp>
+        <p:nvSpPr>
+          <p:cNvPr id="4" name="Tijdelijke aanduiding voor dianummer 3"/>
+          <p:cNvSpPr>
+            <a:spLocks noGrp="1"/>
+          </p:cNvSpPr>
+          <p:nvPr>
+            <p:ph type="sldNum" sz="quarter" idx="10"/>
+          </p:nvPr>
+        </p:nvSpPr>
+        <p:spPr/>
+        <p:txBody>
+          <a:bodyPr/>
+          <a:lstStyle/>
+          <a:p>
+            <a:fld id="{15A33517-824B-4115-AD3E-16E3532C9CE7}" type="slidenum">
+              <a:rPr lang="nl-NL" altLang="nl-NL" smtClean="0"/>
+              <a:pPr/>
+              <a:t>4</a:t>
+            </a:fld>
+            <a:endParaRPr lang="nl-NL" altLang="nl-NL"/>
+          </a:p>
+        </p:txBody>
+      </p:sp>
+      <p:sp>
+        <p:nvSpPr>
+          <p:cNvPr id="7" name="Tekstvak 6"/>
+          <p:cNvSpPr txBox="1"/>
+          <p:nvPr/>
+        </p:nvSpPr>
+        <p:spPr>
+          <a:xfrm>
+            <a:off x="6710902" y="539750"/>
+            <a:ext cx="2347373" cy="3433422"/>
+          </a:xfrm>
+          <a:prstGeom prst="rect">
+            <a:avLst/>
+          </a:prstGeom>
+        </p:spPr>
+        <p:txBody>
+          <a:bodyPr wrap="square" rtlCol="0" anchor="t">
+            <a:normAutofit/>
+          </a:bodyPr>
+          <a:lstStyle/>
+          <a:p>
+            <a:r>
+              <a:rPr lang="en-US" dirty="0">
+                <a:solidFill>
+                  <a:schemeClr val="tx1"/>
+                </a:solidFill>
+              </a:rPr>
+              <a:t>Basic</a:t>
+            </a:r>
+          </a:p>
+          <a:p>
+            <a:pPr marL="285750" indent="-285750">
+              <a:buFont typeface="Arial" panose="020B0604020202020204" pitchFamily="34" charset="0"/>
+              <a:buChar char="•"/>
+            </a:pPr>
+            <a:r>
+              <a:rPr lang="en-US" dirty="0"/>
+              <a:t>Turret aiming</a:t>
+            </a:r>
+          </a:p>
+          <a:p>
+            <a:pPr marL="285750" indent="-285750">
+              <a:buFont typeface="Arial" panose="020B0604020202020204" pitchFamily="34" charset="0"/>
+              <a:buChar char="•"/>
+            </a:pPr>
+            <a:r>
+              <a:rPr lang="en-US" dirty="0"/>
+              <a:t>Enemy movement</a:t>
+            </a:r>
+          </a:p>
+          <a:p>
+            <a:pPr marL="285750" indent="-285750">
+              <a:buFont typeface="Arial" panose="020B0604020202020204" pitchFamily="34" charset="0"/>
+              <a:buChar char="•"/>
+            </a:pPr>
+            <a:r>
+              <a:rPr lang="en-US" dirty="0">
+                <a:solidFill>
+                  <a:schemeClr val="tx1"/>
+                </a:solidFill>
+              </a:rPr>
+              <a:t>Map data where to build &amp; walk</a:t>
+            </a:r>
+          </a:p>
+          <a:p>
+            <a:pPr marL="285750" indent="-285750">
+              <a:buFont typeface="Arial" panose="020B0604020202020204" pitchFamily="34" charset="0"/>
+              <a:buChar char="•"/>
+            </a:pPr>
+            <a:endParaRPr lang="en-US" dirty="0">
+              <a:solidFill>
+                <a:schemeClr val="tx1"/>
+              </a:solidFill>
+            </a:endParaRPr>
+          </a:p>
+          <a:p>
+            <a:r>
+              <a:rPr lang="en-US" dirty="0">
+                <a:solidFill>
+                  <a:schemeClr val="tx1"/>
+                </a:solidFill>
+              </a:rPr>
+              <a:t>GUI </a:t>
+            </a:r>
+          </a:p>
+          <a:p>
+            <a:endParaRPr lang="en-US" dirty="0"/>
+          </a:p>
+          <a:p>
+            <a:endParaRPr lang="en-US" dirty="0">
+              <a:solidFill>
+                <a:schemeClr val="tx1"/>
+              </a:solidFill>
+            </a:endParaRPr>
+          </a:p>
+          <a:p>
+            <a:endParaRPr lang="en-US" dirty="0"/>
+          </a:p>
+          <a:p>
+            <a:r>
+              <a:rPr lang="en-US" dirty="0">
+                <a:solidFill>
+                  <a:schemeClr val="tx1"/>
+                </a:solidFill>
+              </a:rPr>
+              <a:t>Debug &amp; control</a:t>
+            </a:r>
+          </a:p>
+          <a:p>
+            <a:endParaRPr lang="en-US" dirty="0"/>
+          </a:p>
+          <a:p>
+            <a:endParaRPr lang="en-US" dirty="0">
+              <a:solidFill>
+                <a:schemeClr val="tx1"/>
+              </a:solidFill>
+            </a:endParaRPr>
+          </a:p>
+          <a:p>
+            <a:endParaRPr lang="en-US" dirty="0"/>
+          </a:p>
+          <a:p>
+            <a:endParaRPr lang="en-US" dirty="0">
+              <a:solidFill>
+                <a:schemeClr val="tx1"/>
+              </a:solidFill>
+            </a:endParaRPr>
+          </a:p>
+          <a:p>
+            <a:endParaRPr lang="en-US" dirty="0"/>
+          </a:p>
+          <a:p>
+            <a:endParaRPr lang="en-US" dirty="0">
+              <a:solidFill>
+                <a:schemeClr val="tx1"/>
+              </a:solidFill>
+            </a:endParaRPr>
+          </a:p>
+          <a:p>
+            <a:endParaRPr lang="en-US" dirty="0"/>
+          </a:p>
+          <a:p>
+            <a:endParaRPr lang="en-US" dirty="0">
+              <a:solidFill>
+                <a:schemeClr val="tx1"/>
+              </a:solidFill>
+            </a:endParaRPr>
+          </a:p>
+          <a:p>
+            <a:endParaRPr lang="en-US" dirty="0"/>
+          </a:p>
+        </p:txBody>
+      </p:sp>
+      <p:pic>
+        <p:nvPicPr>
+          <p:cNvPr id="8" name="Afbeelding 7"/>
+          <p:cNvPicPr>
+            <a:picLocks noChangeAspect="1"/>
+          </p:cNvPicPr>
+          <p:nvPr/>
+        </p:nvPicPr>
+        <p:blipFill>
+          <a:blip r:embed="rId3"/>
+          <a:stretch>
+            <a:fillRect/>
+          </a:stretch>
+        </p:blipFill>
+        <p:spPr>
+          <a:xfrm>
+            <a:off x="3009900" y="3834306"/>
+            <a:ext cx="5562600" cy="2920507"/>
           </a:xfrm>
           <a:prstGeom prst="rect">
             <a:avLst/>
           </a:prstGeom>
         </p:spPr>
       </p:pic>
-      <p:sp>
-        <p:nvSpPr>
-          <p:cNvPr id="7" name="Tijdelijke aanduiding voor inhoud 6"/>
-          <p:cNvSpPr>
-            <a:spLocks noGrp="1"/>
-          </p:cNvSpPr>
-          <p:nvPr>
-            <p:ph sz="half" idx="2"/>
-          </p:nvPr>
-        </p:nvSpPr>
-        <p:spPr/>
-        <p:txBody>
-          <a:bodyPr/>
-          <a:lstStyle/>
-          <a:p>
-            <a:r>
-              <a:rPr lang="en-US" dirty="0"/>
-              <a:t> Overview of the</a:t>
-            </a:r>
-            <a:endParaRPr lang="nl-NL" dirty="0"/>
-          </a:p>
-          <a:p>
-            <a:pPr marL="457200" lvl="1" indent="0">
-              <a:buNone/>
-            </a:pPr>
-            <a:r>
-              <a:rPr lang="en-US" dirty="0"/>
-              <a:t>Main code :							Important difference between 									GLUT functions</a:t>
-            </a:r>
-          </a:p>
-          <a:p>
-            <a:pPr marL="457200" lvl="1" indent="0">
-              <a:buNone/>
-            </a:pPr>
-            <a:endParaRPr lang="en-US" dirty="0"/>
-          </a:p>
-          <a:p>
-            <a:pPr marL="457200" lvl="1" indent="0">
-              <a:buNone/>
-            </a:pPr>
-            <a:endParaRPr lang="en-US" dirty="0"/>
-          </a:p>
-          <a:p>
-            <a:pPr marL="457200" lvl="1" indent="0">
-              <a:buNone/>
-            </a:pPr>
-            <a:endParaRPr lang="en-US" dirty="0"/>
-          </a:p>
-          <a:p>
-            <a:pPr marL="457200" lvl="1" indent="0">
-              <a:buNone/>
-            </a:pPr>
-            <a:endParaRPr lang="en-US" dirty="0"/>
-          </a:p>
-          <a:p>
-            <a:pPr marL="457200" lvl="1" indent="0">
-              <a:buNone/>
-            </a:pPr>
-            <a:endParaRPr lang="en-US" dirty="0"/>
-          </a:p>
-          <a:p>
-            <a:pPr marL="457200" lvl="1" indent="0">
-              <a:buNone/>
-            </a:pPr>
-            <a:endParaRPr lang="en-US" dirty="0"/>
-          </a:p>
-          <a:p>
-            <a:pPr marL="457200" lvl="1" indent="0">
-              <a:buNone/>
-            </a:pPr>
-            <a:endParaRPr lang="en-US" dirty="0"/>
-          </a:p>
-          <a:p>
-            <a:pPr marL="457200" lvl="1" indent="0">
-              <a:buNone/>
-            </a:pPr>
-            <a:endParaRPr lang="en-US" dirty="0"/>
-          </a:p>
-          <a:p>
-            <a:pPr marL="457200" lvl="1" indent="0">
-              <a:buNone/>
-            </a:pPr>
-            <a:endParaRPr lang="en-US" dirty="0"/>
-          </a:p>
-          <a:p>
-            <a:pPr marL="457200" lvl="1" indent="0">
-              <a:buNone/>
-            </a:pPr>
-            <a:r>
-              <a:rPr lang="en-US" dirty="0"/>
-              <a:t>And own functions</a:t>
-            </a:r>
-          </a:p>
-          <a:p>
-            <a:pPr marL="457200" lvl="1" indent="0">
-              <a:buNone/>
-            </a:pPr>
-            <a:endParaRPr lang="en-US" dirty="0"/>
-          </a:p>
-        </p:txBody>
-      </p:sp>
     </p:spTree>
     <p:extLst>
       <p:ext uri="{BB962C8B-B14F-4D97-AF65-F5344CB8AC3E}">
-        <p14:creationId xmlns:p14="http://schemas.microsoft.com/office/powerpoint/2010/main" val="552255126"/>
+        <p14:creationId xmlns:p14="http://schemas.microsoft.com/office/powerpoint/2010/main" val="2987437596"/>
       </p:ext>
     </p:extLst>
   </p:cSld>
@@ -6012,12 +7506,12 @@
       </p:grpSpPr>
       <p:sp>
         <p:nvSpPr>
-          <p:cNvPr id="2" name="Tijdelijke aanduiding voor inhoud 1"/>
-          <p:cNvSpPr>
-            <a:spLocks noGrp="1"/>
-          </p:cNvSpPr>
-          <p:nvPr>
-            <p:ph sz="half" idx="2"/>
+          <p:cNvPr id="3" name="Ondertitel 2"/>
+          <p:cNvSpPr>
+            <a:spLocks noGrp="1"/>
+          </p:cNvSpPr>
+          <p:nvPr>
+            <p:ph type="subTitle" idx="1"/>
           </p:nvPr>
         </p:nvSpPr>
         <p:spPr/>
@@ -6026,59 +7520,8 @@
           <a:lstStyle/>
           <a:p>
             <a:r>
-              <a:rPr lang="nl-NL" dirty="0" err="1"/>
-              <a:t>Includes</a:t>
-            </a:r>
-            <a:r>
-              <a:rPr lang="nl-NL" dirty="0"/>
-              <a:t> of </a:t>
-            </a:r>
-            <a:r>
-              <a:rPr lang="nl-NL" dirty="0" err="1"/>
-              <a:t>Main</a:t>
-            </a:r>
-            <a:r>
-              <a:rPr lang="nl-NL" dirty="0"/>
-              <a:t> file:</a:t>
-            </a:r>
-          </a:p>
-          <a:p>
-            <a:r>
               <a:rPr lang="en-US" dirty="0"/>
-              <a:t>Vector use instead of linked list</a:t>
-            </a:r>
-          </a:p>
-          <a:p>
-            <a:endParaRPr lang="nl-NL" dirty="0"/>
-          </a:p>
-          <a:p>
-            <a:pPr lvl="1"/>
-            <a:endParaRPr lang="en-US" dirty="0"/>
-          </a:p>
-        </p:txBody>
-      </p:sp>
-      <p:sp>
-        <p:nvSpPr>
-          <p:cNvPr id="3" name="Ondertitel 2"/>
-          <p:cNvSpPr>
-            <a:spLocks noGrp="1"/>
-          </p:cNvSpPr>
-          <p:nvPr>
-            <p:ph type="subTitle" idx="1"/>
-          </p:nvPr>
-        </p:nvSpPr>
-        <p:spPr/>
-        <p:txBody>
-          <a:bodyPr/>
-          <a:lstStyle/>
-          <a:p>
-            <a:r>
-              <a:rPr lang="en-US" dirty="0"/>
-              <a:t>Overview || </a:t>
-            </a:r>
-            <a:r>
-              <a:rPr lang="en-US"/>
-              <a:t>includes Main</a:t>
+              <a:t>Overview Code I Main</a:t>
             </a:r>
             <a:endParaRPr lang="nl-NL" dirty="0"/>
           </a:p>
@@ -6108,119 +7551,14 @@
           </a:p>
         </p:txBody>
       </p:sp>
-      <p:pic>
-        <p:nvPicPr>
-          <p:cNvPr id="6" name="Afbeelding 5"/>
-          <p:cNvPicPr>
-            <a:picLocks noChangeAspect="1"/>
-          </p:cNvPicPr>
-          <p:nvPr/>
-        </p:nvPicPr>
-        <p:blipFill>
-          <a:blip r:embed="rId2"/>
-          <a:stretch>
-            <a:fillRect/>
-          </a:stretch>
-        </p:blipFill>
-        <p:spPr>
-          <a:xfrm>
-            <a:off x="0" y="3361084"/>
-            <a:ext cx="9144000" cy="2962762"/>
-          </a:xfrm>
-          <a:prstGeom prst="rect">
-            <a:avLst/>
-          </a:prstGeom>
-        </p:spPr>
-      </p:pic>
-    </p:spTree>
-    <p:extLst>
-      <p:ext uri="{BB962C8B-B14F-4D97-AF65-F5344CB8AC3E}">
-        <p14:creationId xmlns:p14="http://schemas.microsoft.com/office/powerpoint/2010/main" val="2908102908"/>
-      </p:ext>
-    </p:extLst>
-  </p:cSld>
-  <p:clrMapOvr>
-    <a:masterClrMapping/>
-  </p:clrMapOvr>
-</p:sld>
-</file>
-
-<file path=ppt/slides/slide6.xml><?xml version="1.0" encoding="utf-8"?>
-<p:sld xmlns:a="http://schemas.openxmlformats.org/drawingml/2006/main" xmlns:r="http://schemas.openxmlformats.org/officeDocument/2006/relationships" xmlns:p="http://schemas.openxmlformats.org/presentationml/2006/main">
-  <p:cSld>
-    <p:spTree>
-      <p:nvGrpSpPr>
-        <p:cNvPr id="1" name=""/>
-        <p:cNvGrpSpPr/>
-        <p:nvPr/>
-      </p:nvGrpSpPr>
-      <p:grpSpPr>
-        <a:xfrm>
-          <a:off x="0" y="0"/>
-          <a:ext cx="0" cy="0"/>
-          <a:chOff x="0" y="0"/>
-          <a:chExt cx="0" cy="0"/>
-        </a:xfrm>
-      </p:grpSpPr>
-      <p:pic>
-        <p:nvPicPr>
-          <p:cNvPr id="5" name="Tijdelijke aanduiding voor inhoud 4"/>
-          <p:cNvPicPr>
-            <a:picLocks noGrp="1" noChangeAspect="1"/>
-          </p:cNvPicPr>
+      <p:sp>
+        <p:nvSpPr>
+          <p:cNvPr id="7" name="Tijdelijke aanduiding voor inhoud 6"/>
+          <p:cNvSpPr>
+            <a:spLocks noGrp="1"/>
+          </p:cNvSpPr>
           <p:nvPr>
             <p:ph sz="half" idx="2"/>
-          </p:nvPr>
-        </p:nvPicPr>
-        <p:blipFill>
-          <a:blip r:embed="rId2"/>
-          <a:stretch>
-            <a:fillRect/>
-          </a:stretch>
-        </p:blipFill>
-        <p:spPr>
-          <a:xfrm>
-            <a:off x="3590063" y="0"/>
-            <a:ext cx="5553937" cy="3974937"/>
-          </a:xfrm>
-          <a:prstGeom prst="rect">
-            <a:avLst/>
-          </a:prstGeom>
-        </p:spPr>
-      </p:pic>
-      <p:sp>
-        <p:nvSpPr>
-          <p:cNvPr id="3" name="Ondertitel 2"/>
-          <p:cNvSpPr>
-            <a:spLocks noGrp="1"/>
-          </p:cNvSpPr>
-          <p:nvPr>
-            <p:ph type="subTitle" idx="1"/>
-          </p:nvPr>
-        </p:nvSpPr>
-        <p:spPr/>
-        <p:txBody>
-          <a:bodyPr>
-            <a:normAutofit/>
-          </a:bodyPr>
-          <a:lstStyle/>
-          <a:p>
-            <a:r>
-              <a:rPr lang="en-US" dirty="0"/>
-              <a:t>Overview || functions Main</a:t>
-            </a:r>
-            <a:endParaRPr lang="nl-NL" dirty="0"/>
-          </a:p>
-        </p:txBody>
-      </p:sp>
-      <p:sp>
-        <p:nvSpPr>
-          <p:cNvPr id="4" name="Tijdelijke aanduiding voor dianummer 3"/>
-          <p:cNvSpPr>
-            <a:spLocks noGrp="1"/>
-          </p:cNvSpPr>
-          <p:nvPr>
-            <p:ph type="sldNum" sz="quarter" idx="10"/>
           </p:nvPr>
         </p:nvSpPr>
         <p:spPr/>
@@ -6228,12 +7566,74 @@
           <a:bodyPr/>
           <a:lstStyle/>
           <a:p>
-            <a:fld id="{15A33517-824B-4115-AD3E-16E3532C9CE7}" type="slidenum">
-              <a:rPr lang="nl-NL" altLang="nl-NL" smtClean="0"/>
-              <a:pPr/>
-              <a:t>6</a:t>
-            </a:fld>
-            <a:endParaRPr lang="nl-NL" altLang="nl-NL"/>
+            <a:r>
+              <a:rPr lang="en-US" dirty="0"/>
+              <a:t> Overview of the</a:t>
+            </a:r>
+            <a:endParaRPr lang="nl-NL" dirty="0"/>
+          </a:p>
+          <a:p>
+            <a:pPr marL="457200" lvl="1" indent="0">
+              <a:buNone/>
+            </a:pPr>
+            <a:r>
+              <a:rPr lang="en-US" dirty="0"/>
+              <a:t>Main code :							</a:t>
+            </a:r>
+          </a:p>
+          <a:p>
+            <a:pPr marL="457200" lvl="1" indent="0">
+              <a:buNone/>
+            </a:pPr>
+            <a:endParaRPr lang="en-US" dirty="0"/>
+          </a:p>
+          <a:p>
+            <a:pPr marL="457200" lvl="1" indent="0">
+              <a:buNone/>
+            </a:pPr>
+            <a:endParaRPr lang="en-US" dirty="0"/>
+          </a:p>
+          <a:p>
+            <a:pPr marL="457200" lvl="1" indent="0">
+              <a:buNone/>
+            </a:pPr>
+            <a:endParaRPr lang="en-US" dirty="0"/>
+          </a:p>
+          <a:p>
+            <a:pPr marL="457200" lvl="1" indent="0">
+              <a:buNone/>
+            </a:pPr>
+            <a:endParaRPr lang="en-US" dirty="0"/>
+          </a:p>
+          <a:p>
+            <a:pPr marL="457200" lvl="1" indent="0">
+              <a:buNone/>
+            </a:pPr>
+            <a:endParaRPr lang="en-US" dirty="0"/>
+          </a:p>
+          <a:p>
+            <a:pPr marL="457200" lvl="1" indent="0">
+              <a:buNone/>
+            </a:pPr>
+            <a:endParaRPr lang="en-US" dirty="0"/>
+          </a:p>
+          <a:p>
+            <a:pPr marL="457200" lvl="1" indent="0">
+              <a:buNone/>
+            </a:pPr>
+            <a:endParaRPr lang="en-US" dirty="0"/>
+          </a:p>
+          <a:p>
+            <a:pPr marL="457200" lvl="1" indent="0">
+              <a:buNone/>
+            </a:pPr>
+            <a:endParaRPr lang="en-US" dirty="0"/>
+          </a:p>
+          <a:p>
+            <a:pPr marL="457200" lvl="1" indent="0">
+              <a:buNone/>
+            </a:pPr>
+            <a:endParaRPr lang="en-US" dirty="0"/>
           </a:p>
         </p:txBody>
       </p:sp>
@@ -6253,141 +7653,136 @@
         </p:blipFill>
         <p:spPr>
           <a:xfrm>
-            <a:off x="0" y="2504993"/>
-            <a:ext cx="3962400" cy="3733800"/>
+            <a:off x="49213" y="650274"/>
+            <a:ext cx="9094787" cy="5673571"/>
           </a:xfrm>
           <a:prstGeom prst="rect">
             <a:avLst/>
           </a:prstGeom>
         </p:spPr>
       </p:pic>
-      <p:sp>
-        <p:nvSpPr>
-          <p:cNvPr id="9" name="Tekstvak 8"/>
-          <p:cNvSpPr txBox="1"/>
-          <p:nvPr/>
-        </p:nvSpPr>
-        <p:spPr>
-          <a:xfrm>
-            <a:off x="228600" y="723900"/>
-            <a:ext cx="3228975" cy="1514475"/>
-          </a:xfrm>
-          <a:prstGeom prst="rect">
-            <a:avLst/>
-          </a:prstGeom>
-        </p:spPr>
-        <p:txBody>
-          <a:bodyPr wrap="square" rtlCol="0" anchor="t">
-            <a:normAutofit/>
-          </a:bodyPr>
-          <a:lstStyle/>
-          <a:p>
-            <a:endParaRPr lang="nl-NL" dirty="0">
-              <a:solidFill>
-                <a:schemeClr val="tx1"/>
-              </a:solidFill>
-            </a:endParaRPr>
-          </a:p>
-        </p:txBody>
-      </p:sp>
-      <p:sp>
-        <p:nvSpPr>
-          <p:cNvPr id="10" name="Tekstvak 9"/>
-          <p:cNvSpPr txBox="1"/>
-          <p:nvPr/>
-        </p:nvSpPr>
-        <p:spPr>
-          <a:xfrm>
-            <a:off x="228600" y="723900"/>
-            <a:ext cx="3228975" cy="1666875"/>
-          </a:xfrm>
-          <a:prstGeom prst="rect">
-            <a:avLst/>
-          </a:prstGeom>
-        </p:spPr>
-        <p:txBody>
-          <a:bodyPr wrap="square" rtlCol="0" anchor="t">
-            <a:normAutofit/>
-          </a:bodyPr>
-          <a:lstStyle/>
-          <a:p>
-            <a:endParaRPr lang="nl-NL" dirty="0">
-              <a:solidFill>
-                <a:schemeClr val="tx1"/>
-              </a:solidFill>
-            </a:endParaRPr>
-          </a:p>
-        </p:txBody>
-      </p:sp>
-      <p:sp>
-        <p:nvSpPr>
-          <p:cNvPr id="11" name="Tekstvak 10"/>
-          <p:cNvSpPr txBox="1"/>
-          <p:nvPr/>
-        </p:nvSpPr>
-        <p:spPr>
-          <a:xfrm>
-            <a:off x="312738" y="723899"/>
-            <a:ext cx="3277325" cy="1666875"/>
-          </a:xfrm>
-          <a:prstGeom prst="rect">
-            <a:avLst/>
-          </a:prstGeom>
-        </p:spPr>
-        <p:txBody>
-          <a:bodyPr wrap="square" rtlCol="0" anchor="t">
-            <a:normAutofit lnSpcReduction="10000"/>
-          </a:bodyPr>
-          <a:lstStyle/>
-          <a:p>
-            <a:r>
-              <a:rPr lang="en-US" dirty="0"/>
-              <a:t>Important  functions :</a:t>
-            </a:r>
-          </a:p>
-          <a:p>
-            <a:pPr marL="285750" indent="-285750">
-              <a:buFont typeface="Arial" panose="020B0604020202020204" pitchFamily="34" charset="0"/>
-              <a:buChar char="•"/>
-            </a:pPr>
-            <a:r>
-              <a:rPr lang="en-US" dirty="0"/>
-              <a:t>Idle(): Calculating the new positions of enemy’s, turret's and bullets</a:t>
-            </a:r>
-          </a:p>
-          <a:p>
-            <a:pPr marL="285750" indent="-285750">
-              <a:buFont typeface="Arial" panose="020B0604020202020204" pitchFamily="34" charset="0"/>
-              <a:buChar char="•"/>
-            </a:pPr>
-            <a:r>
-              <a:rPr lang="en-US" dirty="0" err="1"/>
-              <a:t>Keyfunc</a:t>
-            </a:r>
-            <a:r>
-              <a:rPr lang="en-US" dirty="0"/>
-              <a:t>(): Spawns enemy’s and turret’s</a:t>
-            </a:r>
-          </a:p>
-          <a:p>
-            <a:endParaRPr lang="nl-NL" dirty="0">
-              <a:solidFill>
-                <a:schemeClr val="tx1"/>
-              </a:solidFill>
-            </a:endParaRPr>
-          </a:p>
-        </p:txBody>
-      </p:sp>
     </p:spTree>
     <p:extLst>
       <p:ext uri="{BB962C8B-B14F-4D97-AF65-F5344CB8AC3E}">
-        <p14:creationId xmlns:p14="http://schemas.microsoft.com/office/powerpoint/2010/main" val="842188939"/>
+        <p14:creationId xmlns:p14="http://schemas.microsoft.com/office/powerpoint/2010/main" val="552255126"/>
       </p:ext>
     </p:extLst>
   </p:cSld>
   <p:clrMapOvr>
     <a:masterClrMapping/>
   </p:clrMapOvr>
+</p:sld>
+</file>
+
+<file path=ppt/slides/slide6.xml><?xml version="1.0" encoding="utf-8"?>
+<p:sld xmlns:a="http://schemas.openxmlformats.org/drawingml/2006/main" xmlns:r="http://schemas.openxmlformats.org/officeDocument/2006/relationships" xmlns:p="http://schemas.openxmlformats.org/presentationml/2006/main" show="0">
+  <p:cSld>
+    <p:spTree>
+      <p:nvGrpSpPr>
+        <p:cNvPr id="1" name=""/>
+        <p:cNvGrpSpPr/>
+        <p:nvPr/>
+      </p:nvGrpSpPr>
+      <p:grpSpPr>
+        <a:xfrm>
+          <a:off x="0" y="0"/>
+          <a:ext cx="0" cy="0"/>
+          <a:chOff x="0" y="0"/>
+          <a:chExt cx="0" cy="0"/>
+        </a:xfrm>
+      </p:grpSpPr>
+      <p:sp>
+        <p:nvSpPr>
+          <p:cNvPr id="2" name="Tijdelijke aanduiding voor inhoud 1"/>
+          <p:cNvSpPr>
+            <a:spLocks noGrp="1"/>
+          </p:cNvSpPr>
+          <p:nvPr>
+            <p:ph sz="half" idx="2"/>
+          </p:nvPr>
+        </p:nvSpPr>
+        <p:spPr/>
+        <p:txBody>
+          <a:bodyPr/>
+          <a:lstStyle/>
+          <a:p>
+            <a:r>
+              <a:rPr lang="en-US" dirty="0"/>
+              <a:t>Number </a:t>
+            </a:r>
+            <a:endParaRPr lang="nl-NL" dirty="0"/>
+          </a:p>
+        </p:txBody>
+      </p:sp>
+      <p:sp>
+        <p:nvSpPr>
+          <p:cNvPr id="3" name="Ondertitel 2"/>
+          <p:cNvSpPr>
+            <a:spLocks noGrp="1"/>
+          </p:cNvSpPr>
+          <p:nvPr>
+            <p:ph type="subTitle" idx="1"/>
+          </p:nvPr>
+        </p:nvSpPr>
+        <p:spPr/>
+        <p:txBody>
+          <a:bodyPr/>
+          <a:lstStyle/>
+          <a:p>
+            <a:r>
+              <a:rPr lang="en-US" dirty="0" err="1"/>
+              <a:t>Statictics</a:t>
+            </a:r>
+            <a:r>
+              <a:rPr lang="en-US" dirty="0"/>
+              <a:t> </a:t>
+            </a:r>
+            <a:endParaRPr lang="nl-NL" dirty="0"/>
+          </a:p>
+        </p:txBody>
+      </p:sp>
+      <p:sp>
+        <p:nvSpPr>
+          <p:cNvPr id="4" name="Tijdelijke aanduiding voor dianummer 3"/>
+          <p:cNvSpPr>
+            <a:spLocks noGrp="1"/>
+          </p:cNvSpPr>
+          <p:nvPr>
+            <p:ph type="sldNum" sz="quarter" idx="10"/>
+          </p:nvPr>
+        </p:nvSpPr>
+        <p:spPr/>
+        <p:txBody>
+          <a:bodyPr/>
+          <a:lstStyle/>
+          <a:p>
+            <a:fld id="{15A33517-824B-4115-AD3E-16E3532C9CE7}" type="slidenum">
+              <a:rPr lang="nl-NL" altLang="nl-NL" smtClean="0"/>
+              <a:pPr/>
+              <a:t>6</a:t>
+            </a:fld>
+            <a:endParaRPr lang="nl-NL" altLang="nl-NL"/>
+          </a:p>
+        </p:txBody>
+      </p:sp>
+    </p:spTree>
+    <p:extLst>
+      <p:ext uri="{BB962C8B-B14F-4D97-AF65-F5344CB8AC3E}">
+        <p14:creationId xmlns:p14="http://schemas.microsoft.com/office/powerpoint/2010/main" val="664527175"/>
+      </p:ext>
+    </p:extLst>
+  </p:cSld>
+  <p:clrMapOvr>
+    <a:masterClrMapping/>
+  </p:clrMapOvr>
+  <mc:AlternateContent xmlns:mc="http://schemas.openxmlformats.org/markup-compatibility/2006">
+    <mc:Choice xmlns:p14="http://schemas.microsoft.com/office/powerpoint/2010/main" Requires="p14">
+      <p:transition spd="slow" p14:dur="2000"/>
+    </mc:Choice>
+    <mc:Fallback>
+      <p:transition spd="slow"/>
+    </mc:Fallback>
+  </mc:AlternateContent>
 </p:sld>
 </file>
 
@@ -6410,12 +7805,12 @@
       </p:grpSpPr>
       <p:sp>
         <p:nvSpPr>
-          <p:cNvPr id="3" name="Ondertitel 2"/>
-          <p:cNvSpPr>
-            <a:spLocks noGrp="1"/>
-          </p:cNvSpPr>
-          <p:nvPr>
-            <p:ph type="subTitle" idx="1"/>
+          <p:cNvPr id="2" name="Tijdelijke aanduiding voor inhoud 1"/>
+          <p:cNvSpPr>
+            <a:spLocks noGrp="1"/>
+          </p:cNvSpPr>
+          <p:nvPr>
+            <p:ph sz="half" idx="2"/>
           </p:nvPr>
         </p:nvSpPr>
         <p:spPr/>
@@ -6425,7 +7820,70 @@
           <a:p>
             <a:r>
               <a:rPr lang="en-US" dirty="0"/>
-              <a:t>Overview Code |||</a:t>
+              <a:t>Important library includes</a:t>
+            </a:r>
+          </a:p>
+          <a:p>
+            <a:r>
+              <a:rPr lang="en-US" dirty="0"/>
+              <a:t>Vector use instead of (linked) list</a:t>
+            </a:r>
+          </a:p>
+          <a:p>
+            <a:r>
+              <a:rPr lang="en-US" dirty="0"/>
+              <a:t>Mat library for calculating (mostly circles and intersection points) </a:t>
+            </a:r>
+          </a:p>
+          <a:p>
+            <a:r>
+              <a:rPr lang="en-US" dirty="0" err="1"/>
+              <a:t>Fstream</a:t>
+            </a:r>
+            <a:r>
+              <a:rPr lang="en-US" dirty="0"/>
+              <a:t> and </a:t>
+            </a:r>
+            <a:r>
+              <a:rPr lang="en-US" dirty="0" err="1"/>
+              <a:t>iostream</a:t>
+            </a:r>
+            <a:r>
+              <a:rPr lang="en-US" dirty="0"/>
+              <a:t> for file (map) access</a:t>
+            </a:r>
+          </a:p>
+          <a:p>
+            <a:r>
+              <a:rPr lang="en-US" dirty="0"/>
+              <a:t>Windows for waiting</a:t>
+            </a:r>
+            <a:endParaRPr lang="nl-NL" dirty="0"/>
+          </a:p>
+          <a:p>
+            <a:pPr lvl="1"/>
+            <a:endParaRPr lang="en-US" dirty="0"/>
+          </a:p>
+        </p:txBody>
+      </p:sp>
+      <p:sp>
+        <p:nvSpPr>
+          <p:cNvPr id="3" name="Ondertitel 2"/>
+          <p:cNvSpPr>
+            <a:spLocks noGrp="1"/>
+          </p:cNvSpPr>
+          <p:nvPr>
+            <p:ph type="subTitle" idx="1"/>
+          </p:nvPr>
+        </p:nvSpPr>
+        <p:spPr/>
+        <p:txBody>
+          <a:bodyPr/>
+          <a:lstStyle/>
+          <a:p>
+            <a:r>
+              <a:rPr lang="en-US" dirty="0"/>
+              <a:t>Library includes</a:t>
             </a:r>
             <a:endParaRPr lang="nl-NL" dirty="0"/>
           </a:p>
@@ -6455,41 +7913,34 @@
           </a:p>
         </p:txBody>
       </p:sp>
-      <p:sp>
-        <p:nvSpPr>
-          <p:cNvPr id="9" name="Tijdelijke aanduiding voor inhoud 8"/>
-          <p:cNvSpPr>
-            <a:spLocks noGrp="1"/>
-          </p:cNvSpPr>
-          <p:nvPr>
-            <p:ph sz="half" idx="2"/>
-          </p:nvPr>
-        </p:nvSpPr>
-        <p:spPr/>
-        <p:txBody>
-          <a:bodyPr/>
-          <a:lstStyle/>
-          <a:p>
-            <a:pPr lvl="1"/>
-            <a:r>
-              <a:rPr lang="en-US" dirty="0" err="1"/>
-              <a:t>Exdented</a:t>
-            </a:r>
-            <a:r>
-              <a:rPr lang="en-US" dirty="0"/>
-              <a:t> Part A using classes </a:t>
-            </a:r>
-          </a:p>
-          <a:p>
-            <a:pPr lvl="1"/>
-            <a:endParaRPr lang="nl-NL" dirty="0"/>
-          </a:p>
-        </p:txBody>
-      </p:sp>
+      <p:pic>
+        <p:nvPicPr>
+          <p:cNvPr id="5" name="Afbeelding 4"/>
+          <p:cNvPicPr>
+            <a:picLocks noChangeAspect="1"/>
+          </p:cNvPicPr>
+          <p:nvPr/>
+        </p:nvPicPr>
+        <p:blipFill>
+          <a:blip r:embed="rId3"/>
+          <a:stretch>
+            <a:fillRect/>
+          </a:stretch>
+        </p:blipFill>
+        <p:spPr>
+          <a:xfrm>
+            <a:off x="0" y="3383766"/>
+            <a:ext cx="9144000" cy="2940080"/>
+          </a:xfrm>
+          <a:prstGeom prst="rect">
+            <a:avLst/>
+          </a:prstGeom>
+        </p:spPr>
+      </p:pic>
     </p:spTree>
     <p:extLst>
       <p:ext uri="{BB962C8B-B14F-4D97-AF65-F5344CB8AC3E}">
-        <p14:creationId xmlns:p14="http://schemas.microsoft.com/office/powerpoint/2010/main" val="2472758315"/>
+        <p14:creationId xmlns:p14="http://schemas.microsoft.com/office/powerpoint/2010/main" val="2908102908"/>
       </p:ext>
     </p:extLst>
   </p:cSld>
@@ -6500,7 +7951,7 @@
 </file>
 
 <file path=ppt/slides/slide8.xml><?xml version="1.0" encoding="utf-8"?>
-<p:sld xmlns:a="http://schemas.openxmlformats.org/drawingml/2006/main" xmlns:r="http://schemas.openxmlformats.org/officeDocument/2006/relationships" xmlns:p="http://schemas.openxmlformats.org/presentationml/2006/main">
+<p:sld xmlns:a="http://schemas.openxmlformats.org/drawingml/2006/main" xmlns:r="http://schemas.openxmlformats.org/officeDocument/2006/relationships" xmlns:p="http://schemas.openxmlformats.org/presentationml/2006/main" show="0">
   <p:cSld>
     <p:spTree>
       <p:nvGrpSpPr>
@@ -6531,7 +7982,17 @@
           <a:bodyPr/>
           <a:lstStyle/>
           <a:p>
-            <a:endParaRPr lang="nl-NL"/>
+            <a:r>
+              <a:rPr lang="en-US" dirty="0" err="1"/>
+              <a:t>Init</a:t>
+            </a:r>
+            <a:r>
+              <a:rPr lang="en-US" dirty="0"/>
+              <a:t>()</a:t>
+            </a:r>
+          </a:p>
+          <a:p>
+            <a:endParaRPr lang="nl-NL" dirty="0"/>
           </a:p>
         </p:txBody>
       </p:sp>
@@ -6550,11 +8011,7 @@
           <a:bodyPr/>
           <a:lstStyle/>
           <a:p>
-            <a:r>
-              <a:rPr lang="en-US" dirty="0"/>
-              <a:t>Features</a:t>
-            </a:r>
-            <a:endParaRPr lang="nl-NL" dirty="0"/>
+            <a:endParaRPr lang="nl-NL"/>
           </a:p>
         </p:txBody>
       </p:sp>
@@ -6582,21 +8039,210 @@
           </a:p>
         </p:txBody>
       </p:sp>
+      <p:pic>
+        <p:nvPicPr>
+          <p:cNvPr id="7" name="Afbeelding 6"/>
+          <p:cNvPicPr>
+            <a:picLocks noChangeAspect="1"/>
+          </p:cNvPicPr>
+          <p:nvPr/>
+        </p:nvPicPr>
+        <p:blipFill>
+          <a:blip r:embed="rId3"/>
+          <a:stretch>
+            <a:fillRect/>
+          </a:stretch>
+        </p:blipFill>
+        <p:spPr>
+          <a:xfrm>
+            <a:off x="2468811" y="557213"/>
+            <a:ext cx="6675189" cy="5915025"/>
+          </a:xfrm>
+          <a:prstGeom prst="rect">
+            <a:avLst/>
+          </a:prstGeom>
+        </p:spPr>
+      </p:pic>
+      <p:cxnSp>
+        <p:nvCxnSpPr>
+          <p:cNvPr id="9" name="Rechte verbindingslijn 8"/>
+          <p:cNvCxnSpPr>
+            <a:stCxn id="7" idx="1"/>
+          </p:cNvCxnSpPr>
+          <p:nvPr/>
+        </p:nvCxnSpPr>
+        <p:spPr>
+          <a:xfrm flipV="1">
+            <a:off x="2468811" y="557214"/>
+            <a:ext cx="6675189" cy="2957512"/>
+          </a:xfrm>
+          <a:prstGeom prst="line">
+            <a:avLst/>
+          </a:prstGeom>
+        </p:spPr>
+        <p:style>
+          <a:lnRef idx="2">
+            <a:schemeClr val="accent1"/>
+          </a:lnRef>
+          <a:fillRef idx="0">
+            <a:schemeClr val="accent1"/>
+          </a:fillRef>
+          <a:effectRef idx="1">
+            <a:schemeClr val="accent1"/>
+          </a:effectRef>
+          <a:fontRef idx="minor">
+            <a:schemeClr val="tx1"/>
+          </a:fontRef>
+        </p:style>
+      </p:cxnSp>
     </p:spTree>
     <p:extLst>
       <p:ext uri="{BB962C8B-B14F-4D97-AF65-F5344CB8AC3E}">
-        <p14:creationId xmlns:p14="http://schemas.microsoft.com/office/powerpoint/2010/main" val="1556357675"/>
+        <p14:creationId xmlns:p14="http://schemas.microsoft.com/office/powerpoint/2010/main" val="2306936254"/>
       </p:ext>
     </p:extLst>
   </p:cSld>
   <p:clrMapOvr>
     <a:masterClrMapping/>
   </p:clrMapOvr>
+  <mc:AlternateContent xmlns:mc="http://schemas.openxmlformats.org/markup-compatibility/2006">
+    <mc:Choice xmlns:p159="http://schemas.microsoft.com/office/powerpoint/2015/09/main" Requires="p159">
+      <p:transition xmlns:p14="http://schemas.microsoft.com/office/powerpoint/2010/main" spd="slow" p14:dur="2000">
+        <p159:morph option="byObject"/>
+      </p:transition>
+    </mc:Choice>
+    <mc:Fallback>
+      <p:transition spd="slow">
+        <p:fade/>
+      </p:transition>
+    </mc:Fallback>
+  </mc:AlternateContent>
+  <p:timing>
+    <p:tnLst>
+      <p:par>
+        <p:cTn id="1" dur="indefinite" restart="never" nodeType="tmRoot">
+          <p:childTnLst>
+            <p:seq concurrent="1" nextAc="seek">
+              <p:cTn id="2" dur="indefinite" nodeType="mainSeq">
+                <p:childTnLst>
+                  <p:par>
+                    <p:cTn id="3" fill="hold">
+                      <p:stCondLst>
+                        <p:cond delay="indefinite"/>
+                      </p:stCondLst>
+                      <p:childTnLst>
+                        <p:par>
+                          <p:cTn id="4" fill="hold">
+                            <p:stCondLst>
+                              <p:cond delay="0"/>
+                            </p:stCondLst>
+                            <p:childTnLst>
+                              <p:par>
+                                <p:cTn id="5" presetID="2" presetClass="entr" presetSubtype="4" fill="hold" nodeType="clickEffect">
+                                  <p:stCondLst>
+                                    <p:cond delay="0"/>
+                                  </p:stCondLst>
+                                  <p:childTnLst>
+                                    <p:set>
+                                      <p:cBhvr>
+                                        <p:cTn id="6" dur="1" fill="hold">
+                                          <p:stCondLst>
+                                            <p:cond delay="0"/>
+                                          </p:stCondLst>
+                                        </p:cTn>
+                                        <p:tgtEl>
+                                          <p:spTgt spid="9"/>
+                                        </p:tgtEl>
+                                        <p:attrNameLst>
+                                          <p:attrName>style.visibility</p:attrName>
+                                        </p:attrNameLst>
+                                      </p:cBhvr>
+                                      <p:to>
+                                        <p:strVal val="visible"/>
+                                      </p:to>
+                                    </p:set>
+                                    <p:anim calcmode="lin" valueType="num">
+                                      <p:cBhvr additive="base">
+                                        <p:cTn id="7" dur="500" fill="hold"/>
+                                        <p:tgtEl>
+                                          <p:spTgt spid="9"/>
+                                        </p:tgtEl>
+                                        <p:attrNameLst>
+                                          <p:attrName>ppt_x</p:attrName>
+                                        </p:attrNameLst>
+                                      </p:cBhvr>
+                                      <p:tavLst>
+                                        <p:tav tm="0">
+                                          <p:val>
+                                            <p:strVal val="#ppt_x"/>
+                                          </p:val>
+                                        </p:tav>
+                                        <p:tav tm="100000">
+                                          <p:val>
+                                            <p:strVal val="#ppt_x"/>
+                                          </p:val>
+                                        </p:tav>
+                                      </p:tavLst>
+                                    </p:anim>
+                                    <p:anim calcmode="lin" valueType="num">
+                                      <p:cBhvr additive="base">
+                                        <p:cTn id="8" dur="500" fill="hold"/>
+                                        <p:tgtEl>
+                                          <p:spTgt spid="9"/>
+                                        </p:tgtEl>
+                                        <p:attrNameLst>
+                                          <p:attrName>ppt_y</p:attrName>
+                                        </p:attrNameLst>
+                                      </p:cBhvr>
+                                      <p:tavLst>
+                                        <p:tav tm="0">
+                                          <p:val>
+                                            <p:strVal val="1+#ppt_h/2"/>
+                                          </p:val>
+                                        </p:tav>
+                                        <p:tav tm="100000">
+                                          <p:val>
+                                            <p:strVal val="#ppt_y"/>
+                                          </p:val>
+                                        </p:tav>
+                                      </p:tavLst>
+                                    </p:anim>
+                                  </p:childTnLst>
+                                </p:cTn>
+                              </p:par>
+                            </p:childTnLst>
+                          </p:cTn>
+                        </p:par>
+                      </p:childTnLst>
+                    </p:cTn>
+                  </p:par>
+                </p:childTnLst>
+              </p:cTn>
+              <p:prevCondLst>
+                <p:cond evt="onPrev" delay="0">
+                  <p:tgtEl>
+                    <p:sldTgt/>
+                  </p:tgtEl>
+                </p:cond>
+              </p:prevCondLst>
+              <p:nextCondLst>
+                <p:cond evt="onNext" delay="0">
+                  <p:tgtEl>
+                    <p:sldTgt/>
+                  </p:tgtEl>
+                </p:cond>
+              </p:nextCondLst>
+            </p:seq>
+          </p:childTnLst>
+        </p:cTn>
+      </p:par>
+    </p:tnLst>
+  </p:timing>
 </p:sld>
 </file>
 
 <file path=ppt/slides/slide9.xml><?xml version="1.0" encoding="utf-8"?>
-<p:sld xmlns:a="http://schemas.openxmlformats.org/drawingml/2006/main" xmlns:r="http://schemas.openxmlformats.org/officeDocument/2006/relationships" xmlns:p="http://schemas.openxmlformats.org/presentationml/2006/main">
+<p:sld xmlns:a="http://schemas.openxmlformats.org/drawingml/2006/main" xmlns:r="http://schemas.openxmlformats.org/officeDocument/2006/relationships" xmlns:p="http://schemas.openxmlformats.org/presentationml/2006/main" show="0">
   <p:cSld>
     <p:spTree>
       <p:nvGrpSpPr>
@@ -6614,41 +8260,29 @@
       </p:grpSpPr>
       <p:sp>
         <p:nvSpPr>
-          <p:cNvPr id="2" name="Tijdelijke aanduiding voor inhoud 1"/>
-          <p:cNvSpPr>
-            <a:spLocks noGrp="1"/>
-          </p:cNvSpPr>
-          <p:nvPr>
-            <p:ph sz="half" idx="2"/>
-          </p:nvPr>
-        </p:nvSpPr>
-        <p:spPr/>
-        <p:txBody>
-          <a:bodyPr/>
+          <p:cNvPr id="3" name="Ondertitel 2"/>
+          <p:cNvSpPr>
+            <a:spLocks noGrp="1"/>
+          </p:cNvSpPr>
+          <p:nvPr>
+            <p:ph type="subTitle" idx="1"/>
+          </p:nvPr>
+        </p:nvSpPr>
+        <p:spPr>
+          <a:xfrm>
+            <a:off x="597209" y="6472939"/>
+            <a:ext cx="2041216" cy="281430"/>
+          </a:xfrm>
+        </p:spPr>
+        <p:txBody>
+          <a:bodyPr>
+            <a:normAutofit/>
+          </a:bodyPr>
           <a:lstStyle/>
           <a:p>
-            <a:endParaRPr lang="nl-NL"/>
-          </a:p>
-        </p:txBody>
-      </p:sp>
-      <p:sp>
-        <p:nvSpPr>
-          <p:cNvPr id="3" name="Ondertitel 2"/>
-          <p:cNvSpPr>
-            <a:spLocks noGrp="1"/>
-          </p:cNvSpPr>
-          <p:nvPr>
-            <p:ph type="subTitle" idx="1"/>
-          </p:nvPr>
-        </p:nvSpPr>
-        <p:spPr/>
-        <p:txBody>
-          <a:bodyPr/>
-          <a:lstStyle/>
-          <a:p>
             <a:r>
               <a:rPr lang="en-US" dirty="0"/>
-              <a:t>Tough features </a:t>
+              <a:t>Overview || Important functions</a:t>
             </a:r>
             <a:endParaRPr lang="nl-NL" dirty="0"/>
           </a:p>
@@ -6678,16 +8312,136 @@
           </a:p>
         </p:txBody>
       </p:sp>
+      <p:sp>
+        <p:nvSpPr>
+          <p:cNvPr id="9" name="Tekstvak 8"/>
+          <p:cNvSpPr txBox="1"/>
+          <p:nvPr/>
+        </p:nvSpPr>
+        <p:spPr>
+          <a:xfrm>
+            <a:off x="228600" y="723900"/>
+            <a:ext cx="3228975" cy="1514475"/>
+          </a:xfrm>
+          <a:prstGeom prst="rect">
+            <a:avLst/>
+          </a:prstGeom>
+        </p:spPr>
+        <p:txBody>
+          <a:bodyPr wrap="square" rtlCol="0" anchor="t">
+            <a:normAutofit/>
+          </a:bodyPr>
+          <a:lstStyle/>
+          <a:p>
+            <a:endParaRPr lang="nl-NL" dirty="0">
+              <a:solidFill>
+                <a:schemeClr val="tx1"/>
+              </a:solidFill>
+            </a:endParaRPr>
+          </a:p>
+        </p:txBody>
+      </p:sp>
+      <p:sp>
+        <p:nvSpPr>
+          <p:cNvPr id="10" name="Tekstvak 9"/>
+          <p:cNvSpPr txBox="1"/>
+          <p:nvPr/>
+        </p:nvSpPr>
+        <p:spPr>
+          <a:xfrm>
+            <a:off x="228600" y="723900"/>
+            <a:ext cx="3228975" cy="1666875"/>
+          </a:xfrm>
+          <a:prstGeom prst="rect">
+            <a:avLst/>
+          </a:prstGeom>
+        </p:spPr>
+        <p:txBody>
+          <a:bodyPr wrap="square" rtlCol="0" anchor="t">
+            <a:normAutofit/>
+          </a:bodyPr>
+          <a:lstStyle/>
+          <a:p>
+            <a:endParaRPr lang="nl-NL" dirty="0">
+              <a:solidFill>
+                <a:schemeClr val="tx1"/>
+              </a:solidFill>
+            </a:endParaRPr>
+          </a:p>
+        </p:txBody>
+      </p:sp>
+      <p:pic>
+        <p:nvPicPr>
+          <p:cNvPr id="6" name="Afbeelding 5"/>
+          <p:cNvPicPr>
+            <a:picLocks noChangeAspect="1"/>
+          </p:cNvPicPr>
+          <p:nvPr/>
+        </p:nvPicPr>
+        <p:blipFill>
+          <a:blip r:embed="rId2"/>
+          <a:stretch>
+            <a:fillRect/>
+          </a:stretch>
+        </p:blipFill>
+        <p:spPr>
+          <a:xfrm>
+            <a:off x="3802591" y="2390775"/>
+            <a:ext cx="4791075" cy="3733800"/>
+          </a:xfrm>
+          <a:prstGeom prst="rect">
+            <a:avLst/>
+          </a:prstGeom>
+        </p:spPr>
+      </p:pic>
+      <p:sp>
+        <p:nvSpPr>
+          <p:cNvPr id="7" name="Tijdelijke aanduiding voor inhoud 6"/>
+          <p:cNvSpPr>
+            <a:spLocks noGrp="1"/>
+          </p:cNvSpPr>
+          <p:nvPr>
+            <p:ph sz="half" idx="2"/>
+          </p:nvPr>
+        </p:nvSpPr>
+        <p:spPr/>
+        <p:txBody>
+          <a:bodyPr/>
+          <a:lstStyle/>
+          <a:p>
+            <a:r>
+              <a:rPr lang="en-US" dirty="0"/>
+              <a:t>Idle()</a:t>
+            </a:r>
+          </a:p>
+          <a:p>
+            <a:pPr lvl="1"/>
+            <a:r>
+              <a:rPr lang="en-US" dirty="0"/>
+              <a:t>Calculates all updates </a:t>
+            </a:r>
+            <a:endParaRPr lang="nl-NL" dirty="0"/>
+          </a:p>
+        </p:txBody>
+      </p:sp>
     </p:spTree>
     <p:extLst>
       <p:ext uri="{BB962C8B-B14F-4D97-AF65-F5344CB8AC3E}">
-        <p14:creationId xmlns:p14="http://schemas.microsoft.com/office/powerpoint/2010/main" val="986257339"/>
+        <p14:creationId xmlns:p14="http://schemas.microsoft.com/office/powerpoint/2010/main" val="842188939"/>
       </p:ext>
     </p:extLst>
   </p:cSld>
   <p:clrMapOvr>
     <a:masterClrMapping/>
   </p:clrMapOvr>
+  <mc:AlternateContent xmlns:mc="http://schemas.openxmlformats.org/markup-compatibility/2006">
+    <mc:Choice xmlns:p14="http://schemas.microsoft.com/office/powerpoint/2010/main" Requires="p14">
+      <p:transition spd="slow" p14:dur="2000"/>
+    </mc:Choice>
+    <mc:Fallback>
+      <p:transition spd="slow"/>
+    </mc:Fallback>
+  </mc:AlternateContent>
 </p:sld>
 </file>
 

</xml_diff>